<commit_message>
Fixing the git push --set-upstream in the pic to have space between repo and branch name
</commit_message>
<xml_diff>
--- a/03_infra_ja_automaatio/BasicGitBranchingMinimumForBigTeams/GitBranchingBasics_Illustrated.pptx
+++ b/03_infra_ja_automaatio/BasicGitBranchingMinimumForBigTeams/GitBranchingBasics_Illustrated.pptx
@@ -261,7 +261,7 @@
           <a:p>
             <a:fld id="{A30C02D7-87C6-4842-A648-FED02202F8B9}" type="datetimeFigureOut">
               <a:rPr lang="fi-FI" smtClean="0"/>
-              <a:t>20.9.2022</a:t>
+              <a:t>27.1.2023</a:t>
             </a:fld>
             <a:endParaRPr lang="fi-FI"/>
           </a:p>
@@ -461,7 +461,7 @@
           <a:p>
             <a:fld id="{A30C02D7-87C6-4842-A648-FED02202F8B9}" type="datetimeFigureOut">
               <a:rPr lang="fi-FI" smtClean="0"/>
-              <a:t>20.9.2022</a:t>
+              <a:t>27.1.2023</a:t>
             </a:fld>
             <a:endParaRPr lang="fi-FI"/>
           </a:p>
@@ -671,7 +671,7 @@
           <a:p>
             <a:fld id="{A30C02D7-87C6-4842-A648-FED02202F8B9}" type="datetimeFigureOut">
               <a:rPr lang="fi-FI" smtClean="0"/>
-              <a:t>20.9.2022</a:t>
+              <a:t>27.1.2023</a:t>
             </a:fld>
             <a:endParaRPr lang="fi-FI"/>
           </a:p>
@@ -871,7 +871,7 @@
           <a:p>
             <a:fld id="{A30C02D7-87C6-4842-A648-FED02202F8B9}" type="datetimeFigureOut">
               <a:rPr lang="fi-FI" smtClean="0"/>
-              <a:t>20.9.2022</a:t>
+              <a:t>27.1.2023</a:t>
             </a:fld>
             <a:endParaRPr lang="fi-FI"/>
           </a:p>
@@ -1147,7 +1147,7 @@
           <a:p>
             <a:fld id="{A30C02D7-87C6-4842-A648-FED02202F8B9}" type="datetimeFigureOut">
               <a:rPr lang="fi-FI" smtClean="0"/>
-              <a:t>20.9.2022</a:t>
+              <a:t>27.1.2023</a:t>
             </a:fld>
             <a:endParaRPr lang="fi-FI"/>
           </a:p>
@@ -1415,7 +1415,7 @@
           <a:p>
             <a:fld id="{A30C02D7-87C6-4842-A648-FED02202F8B9}" type="datetimeFigureOut">
               <a:rPr lang="fi-FI" smtClean="0"/>
-              <a:t>20.9.2022</a:t>
+              <a:t>27.1.2023</a:t>
             </a:fld>
             <a:endParaRPr lang="fi-FI"/>
           </a:p>
@@ -1830,7 +1830,7 @@
           <a:p>
             <a:fld id="{A30C02D7-87C6-4842-A648-FED02202F8B9}" type="datetimeFigureOut">
               <a:rPr lang="fi-FI" smtClean="0"/>
-              <a:t>20.9.2022</a:t>
+              <a:t>27.1.2023</a:t>
             </a:fld>
             <a:endParaRPr lang="fi-FI"/>
           </a:p>
@@ -1972,7 +1972,7 @@
           <a:p>
             <a:fld id="{A30C02D7-87C6-4842-A648-FED02202F8B9}" type="datetimeFigureOut">
               <a:rPr lang="fi-FI" smtClean="0"/>
-              <a:t>20.9.2022</a:t>
+              <a:t>27.1.2023</a:t>
             </a:fld>
             <a:endParaRPr lang="fi-FI"/>
           </a:p>
@@ -2085,7 +2085,7 @@
           <a:p>
             <a:fld id="{A30C02D7-87C6-4842-A648-FED02202F8B9}" type="datetimeFigureOut">
               <a:rPr lang="fi-FI" smtClean="0"/>
-              <a:t>20.9.2022</a:t>
+              <a:t>27.1.2023</a:t>
             </a:fld>
             <a:endParaRPr lang="fi-FI"/>
           </a:p>
@@ -2398,7 +2398,7 @@
           <a:p>
             <a:fld id="{A30C02D7-87C6-4842-A648-FED02202F8B9}" type="datetimeFigureOut">
               <a:rPr lang="fi-FI" smtClean="0"/>
-              <a:t>20.9.2022</a:t>
+              <a:t>27.1.2023</a:t>
             </a:fld>
             <a:endParaRPr lang="fi-FI"/>
           </a:p>
@@ -2687,7 +2687,7 @@
           <a:p>
             <a:fld id="{A30C02D7-87C6-4842-A648-FED02202F8B9}" type="datetimeFigureOut">
               <a:rPr lang="fi-FI" smtClean="0"/>
-              <a:t>20.9.2022</a:t>
+              <a:t>27.1.2023</a:t>
             </a:fld>
             <a:endParaRPr lang="fi-FI"/>
           </a:p>
@@ -2930,7 +2930,7 @@
           <a:p>
             <a:fld id="{A30C02D7-87C6-4842-A648-FED02202F8B9}" type="datetimeFigureOut">
               <a:rPr lang="fi-FI" smtClean="0"/>
-              <a:t>20.9.2022</a:t>
+              <a:t>27.1.2023</a:t>
             </a:fld>
             <a:endParaRPr lang="fi-FI"/>
           </a:p>
@@ -4318,8 +4318,8 @@
         </p:nvSpPr>
         <p:spPr>
           <a:xfrm rot="16200000">
-            <a:off x="4802214" y="3131011"/>
-            <a:ext cx="4767844" cy="369332"/>
+            <a:off x="4878356" y="3131011"/>
+            <a:ext cx="4615559" cy="369332"/>
           </a:xfrm>
           <a:prstGeom prst="rect">
             <a:avLst/>
@@ -4399,10 +4399,10 @@
                   </a:schemeClr>
                 </a:solidFill>
               </a:rPr>
-              <a:t>/</a:t>
-            </a:r>
-            <a:r>
-              <a:rPr lang="fi-FI" dirty="0" err="1">
+              <a:t> </a:t>
+            </a:r>
+            <a:r>
+              <a:rPr lang="fi-FI">
                 <a:solidFill>
                   <a:schemeClr val="accent1">
                     <a:lumMod val="75000"/>

</xml_diff>

<commit_message>
Huomautus, että 14.9. osio on työn alla, eikä ilmesty ehkä ennen 14.9.
</commit_message>
<xml_diff>
--- a/03_infra_ja_automaatio/BasicGitBranchingMinimumForBigTeams/GitBranchingBasics_Illustrated.pptx
+++ b/03_infra_ja_automaatio/BasicGitBranchingMinimumForBigTeams/GitBranchingBasics_Illustrated.pptx
@@ -6,6 +6,7 @@
   </p:sldMasterIdLst>
   <p:sldIdLst>
     <p:sldId id="256" r:id="rId2"/>
+    <p:sldId id="257" r:id="rId3"/>
   </p:sldIdLst>
   <p:sldSz cx="12192000" cy="6858000"/>
   <p:notesSz cx="6858000" cy="9144000"/>
@@ -261,7 +262,7 @@
           <a:p>
             <a:fld id="{A30C02D7-87C6-4842-A648-FED02202F8B9}" type="datetimeFigureOut">
               <a:rPr lang="fi-FI" smtClean="0"/>
-              <a:t>27.1.2023</a:t>
+              <a:t>1.9.2023</a:t>
             </a:fld>
             <a:endParaRPr lang="fi-FI"/>
           </a:p>
@@ -461,7 +462,7 @@
           <a:p>
             <a:fld id="{A30C02D7-87C6-4842-A648-FED02202F8B9}" type="datetimeFigureOut">
               <a:rPr lang="fi-FI" smtClean="0"/>
-              <a:t>27.1.2023</a:t>
+              <a:t>1.9.2023</a:t>
             </a:fld>
             <a:endParaRPr lang="fi-FI"/>
           </a:p>
@@ -671,7 +672,7 @@
           <a:p>
             <a:fld id="{A30C02D7-87C6-4842-A648-FED02202F8B9}" type="datetimeFigureOut">
               <a:rPr lang="fi-FI" smtClean="0"/>
-              <a:t>27.1.2023</a:t>
+              <a:t>1.9.2023</a:t>
             </a:fld>
             <a:endParaRPr lang="fi-FI"/>
           </a:p>
@@ -871,7 +872,7 @@
           <a:p>
             <a:fld id="{A30C02D7-87C6-4842-A648-FED02202F8B9}" type="datetimeFigureOut">
               <a:rPr lang="fi-FI" smtClean="0"/>
-              <a:t>27.1.2023</a:t>
+              <a:t>1.9.2023</a:t>
             </a:fld>
             <a:endParaRPr lang="fi-FI"/>
           </a:p>
@@ -1147,7 +1148,7 @@
           <a:p>
             <a:fld id="{A30C02D7-87C6-4842-A648-FED02202F8B9}" type="datetimeFigureOut">
               <a:rPr lang="fi-FI" smtClean="0"/>
-              <a:t>27.1.2023</a:t>
+              <a:t>1.9.2023</a:t>
             </a:fld>
             <a:endParaRPr lang="fi-FI"/>
           </a:p>
@@ -1415,7 +1416,7 @@
           <a:p>
             <a:fld id="{A30C02D7-87C6-4842-A648-FED02202F8B9}" type="datetimeFigureOut">
               <a:rPr lang="fi-FI" smtClean="0"/>
-              <a:t>27.1.2023</a:t>
+              <a:t>1.9.2023</a:t>
             </a:fld>
             <a:endParaRPr lang="fi-FI"/>
           </a:p>
@@ -1830,7 +1831,7 @@
           <a:p>
             <a:fld id="{A30C02D7-87C6-4842-A648-FED02202F8B9}" type="datetimeFigureOut">
               <a:rPr lang="fi-FI" smtClean="0"/>
-              <a:t>27.1.2023</a:t>
+              <a:t>1.9.2023</a:t>
             </a:fld>
             <a:endParaRPr lang="fi-FI"/>
           </a:p>
@@ -1972,7 +1973,7 @@
           <a:p>
             <a:fld id="{A30C02D7-87C6-4842-A648-FED02202F8B9}" type="datetimeFigureOut">
               <a:rPr lang="fi-FI" smtClean="0"/>
-              <a:t>27.1.2023</a:t>
+              <a:t>1.9.2023</a:t>
             </a:fld>
             <a:endParaRPr lang="fi-FI"/>
           </a:p>
@@ -2085,7 +2086,7 @@
           <a:p>
             <a:fld id="{A30C02D7-87C6-4842-A648-FED02202F8B9}" type="datetimeFigureOut">
               <a:rPr lang="fi-FI" smtClean="0"/>
-              <a:t>27.1.2023</a:t>
+              <a:t>1.9.2023</a:t>
             </a:fld>
             <a:endParaRPr lang="fi-FI"/>
           </a:p>
@@ -2398,7 +2399,7 @@
           <a:p>
             <a:fld id="{A30C02D7-87C6-4842-A648-FED02202F8B9}" type="datetimeFigureOut">
               <a:rPr lang="fi-FI" smtClean="0"/>
-              <a:t>27.1.2023</a:t>
+              <a:t>1.9.2023</a:t>
             </a:fld>
             <a:endParaRPr lang="fi-FI"/>
           </a:p>
@@ -2687,7 +2688,7 @@
           <a:p>
             <a:fld id="{A30C02D7-87C6-4842-A648-FED02202F8B9}" type="datetimeFigureOut">
               <a:rPr lang="fi-FI" smtClean="0"/>
-              <a:t>27.1.2023</a:t>
+              <a:t>1.9.2023</a:t>
             </a:fld>
             <a:endParaRPr lang="fi-FI"/>
           </a:p>
@@ -2930,7 +2931,7 @@
           <a:p>
             <a:fld id="{A30C02D7-87C6-4842-A648-FED02202F8B9}" type="datetimeFigureOut">
               <a:rPr lang="fi-FI" smtClean="0"/>
-              <a:t>27.1.2023</a:t>
+              <a:t>1.9.2023</a:t>
             </a:fld>
             <a:endParaRPr lang="fi-FI"/>
           </a:p>
@@ -5625,6 +5626,3366 @@
 </p:sld>
 </file>
 
+<file path=ppt/slides/slide2.xml><?xml version="1.0" encoding="utf-8"?>
+<p:sld xmlns:a="http://schemas.openxmlformats.org/drawingml/2006/main" xmlns:r="http://schemas.openxmlformats.org/officeDocument/2006/relationships" xmlns:p="http://schemas.openxmlformats.org/presentationml/2006/main">
+  <p:cSld>
+    <p:spTree>
+      <p:nvGrpSpPr>
+        <p:cNvPr id="1" name=""/>
+        <p:cNvGrpSpPr/>
+        <p:nvPr/>
+      </p:nvGrpSpPr>
+      <p:grpSpPr>
+        <a:xfrm>
+          <a:off x="0" y="0"/>
+          <a:ext cx="0" cy="0"/>
+          <a:chOff x="0" y="0"/>
+          <a:chExt cx="0" cy="0"/>
+        </a:xfrm>
+      </p:grpSpPr>
+      <p:sp>
+        <p:nvSpPr>
+          <p:cNvPr id="4" name="Flowchart: Magnetic Disk 3">
+            <a:extLst>
+              <a:ext uri="{FF2B5EF4-FFF2-40B4-BE49-F238E27FC236}">
+                <a16:creationId xmlns:a16="http://schemas.microsoft.com/office/drawing/2014/main" id="{5D64B429-37AD-4D09-A4CA-5D8EE5EF72F1}"/>
+              </a:ext>
+            </a:extLst>
+          </p:cNvPr>
+          <p:cNvSpPr/>
+          <p:nvPr/>
+        </p:nvSpPr>
+        <p:spPr>
+          <a:xfrm>
+            <a:off x="372140" y="574158"/>
+            <a:ext cx="1653329" cy="1988287"/>
+          </a:xfrm>
+          <a:prstGeom prst="flowChartMagneticDisk">
+            <a:avLst/>
+          </a:prstGeom>
+          <a:noFill/>
+        </p:spPr>
+        <p:style>
+          <a:lnRef idx="2">
+            <a:schemeClr val="accent1">
+              <a:shade val="50000"/>
+            </a:schemeClr>
+          </a:lnRef>
+          <a:fillRef idx="1">
+            <a:schemeClr val="accent1"/>
+          </a:fillRef>
+          <a:effectRef idx="0">
+            <a:schemeClr val="accent1"/>
+          </a:effectRef>
+          <a:fontRef idx="minor">
+            <a:schemeClr val="lt1"/>
+          </a:fontRef>
+        </p:style>
+        <p:txBody>
+          <a:bodyPr rtlCol="0" anchor="ctr"/>
+          <a:lstStyle/>
+          <a:p>
+            <a:pPr algn="ctr"/>
+            <a:r>
+              <a:rPr lang="fi-FI" dirty="0">
+                <a:solidFill>
+                  <a:schemeClr val="accent1">
+                    <a:lumMod val="75000"/>
+                  </a:schemeClr>
+                </a:solidFill>
+              </a:rPr>
+              <a:t>remote repo</a:t>
+            </a:r>
+          </a:p>
+          <a:p>
+            <a:pPr algn="ctr"/>
+            <a:r>
+              <a:rPr lang="fi-FI" dirty="0">
+                <a:solidFill>
+                  <a:schemeClr val="accent1">
+                    <a:lumMod val="75000"/>
+                  </a:schemeClr>
+                </a:solidFill>
+              </a:rPr>
+              <a:t>= </a:t>
+            </a:r>
+            <a:r>
+              <a:rPr lang="fi-FI" dirty="0" err="1">
+                <a:solidFill>
+                  <a:schemeClr val="accent1">
+                    <a:lumMod val="75000"/>
+                  </a:schemeClr>
+                </a:solidFill>
+              </a:rPr>
+              <a:t>origin</a:t>
+            </a:r>
+            <a:endParaRPr lang="fi-FI" dirty="0">
+              <a:solidFill>
+                <a:schemeClr val="accent1">
+                  <a:lumMod val="75000"/>
+                </a:schemeClr>
+              </a:solidFill>
+            </a:endParaRPr>
+          </a:p>
+          <a:p>
+            <a:pPr algn="ctr"/>
+            <a:r>
+              <a:rPr lang="fi-FI" dirty="0">
+                <a:solidFill>
+                  <a:schemeClr val="accent1">
+                    <a:lumMod val="75000"/>
+                  </a:schemeClr>
+                </a:solidFill>
+              </a:rPr>
+              <a:t>= </a:t>
+            </a:r>
+            <a:r>
+              <a:rPr lang="fi-FI" dirty="0" err="1">
+                <a:solidFill>
+                  <a:schemeClr val="accent1">
+                    <a:lumMod val="75000"/>
+                  </a:schemeClr>
+                </a:solidFill>
+              </a:rPr>
+              <a:t>e.g</a:t>
+            </a:r>
+            <a:r>
+              <a:rPr lang="fi-FI" dirty="0">
+                <a:solidFill>
+                  <a:schemeClr val="accent1">
+                    <a:lumMod val="75000"/>
+                  </a:schemeClr>
+                </a:solidFill>
+              </a:rPr>
+              <a:t>. GitHub </a:t>
+            </a:r>
+            <a:r>
+              <a:rPr lang="fi-FI" dirty="0" err="1">
+                <a:solidFill>
+                  <a:schemeClr val="accent1">
+                    <a:lumMod val="75000"/>
+                  </a:schemeClr>
+                </a:solidFill>
+              </a:rPr>
+              <a:t>or</a:t>
+            </a:r>
+            <a:r>
+              <a:rPr lang="fi-FI" dirty="0">
+                <a:solidFill>
+                  <a:schemeClr val="accent1">
+                    <a:lumMod val="75000"/>
+                  </a:schemeClr>
+                </a:solidFill>
+              </a:rPr>
+              <a:t> </a:t>
+            </a:r>
+            <a:r>
+              <a:rPr lang="fi-FI" dirty="0" err="1">
+                <a:solidFill>
+                  <a:schemeClr val="accent1">
+                    <a:lumMod val="75000"/>
+                  </a:schemeClr>
+                </a:solidFill>
+              </a:rPr>
+              <a:t>other</a:t>
+            </a:r>
+            <a:r>
+              <a:rPr lang="fi-FI" dirty="0">
+                <a:solidFill>
+                  <a:schemeClr val="accent1">
+                    <a:lumMod val="75000"/>
+                  </a:schemeClr>
+                </a:solidFill>
+              </a:rPr>
+              <a:t> </a:t>
+            </a:r>
+            <a:r>
+              <a:rPr lang="fi-FI" dirty="0" err="1">
+                <a:solidFill>
+                  <a:schemeClr val="accent1">
+                    <a:lumMod val="75000"/>
+                  </a:schemeClr>
+                </a:solidFill>
+              </a:rPr>
+              <a:t>cloud</a:t>
+            </a:r>
+            <a:endParaRPr lang="fi-FI" dirty="0">
+              <a:solidFill>
+                <a:schemeClr val="accent1">
+                  <a:lumMod val="75000"/>
+                </a:schemeClr>
+              </a:solidFill>
+            </a:endParaRPr>
+          </a:p>
+        </p:txBody>
+      </p:sp>
+      <p:sp>
+        <p:nvSpPr>
+          <p:cNvPr id="5" name="Flowchart: Magnetic Disk 4">
+            <a:extLst>
+              <a:ext uri="{FF2B5EF4-FFF2-40B4-BE49-F238E27FC236}">
+                <a16:creationId xmlns:a16="http://schemas.microsoft.com/office/drawing/2014/main" id="{09F01B12-FE99-4B22-83CA-8B188B254B57}"/>
+              </a:ext>
+            </a:extLst>
+          </p:cNvPr>
+          <p:cNvSpPr/>
+          <p:nvPr/>
+        </p:nvSpPr>
+        <p:spPr>
+          <a:xfrm>
+            <a:off x="372139" y="4029741"/>
+            <a:ext cx="1653329" cy="1684648"/>
+          </a:xfrm>
+          <a:prstGeom prst="flowChartMagneticDisk">
+            <a:avLst/>
+          </a:prstGeom>
+          <a:noFill/>
+        </p:spPr>
+        <p:style>
+          <a:lnRef idx="2">
+            <a:schemeClr val="accent1">
+              <a:shade val="50000"/>
+            </a:schemeClr>
+          </a:lnRef>
+          <a:fillRef idx="1">
+            <a:schemeClr val="accent1"/>
+          </a:fillRef>
+          <a:effectRef idx="0">
+            <a:schemeClr val="accent1"/>
+          </a:effectRef>
+          <a:fontRef idx="minor">
+            <a:schemeClr val="lt1"/>
+          </a:fontRef>
+        </p:style>
+        <p:txBody>
+          <a:bodyPr rtlCol="0" anchor="ctr"/>
+          <a:lstStyle/>
+          <a:p>
+            <a:pPr algn="ctr"/>
+            <a:r>
+              <a:rPr lang="fi-FI" dirty="0" err="1">
+                <a:solidFill>
+                  <a:schemeClr val="accent1">
+                    <a:lumMod val="75000"/>
+                  </a:schemeClr>
+                </a:solidFill>
+              </a:rPr>
+              <a:t>local</a:t>
+            </a:r>
+            <a:r>
+              <a:rPr lang="fi-FI" dirty="0">
+                <a:solidFill>
+                  <a:schemeClr val="accent1">
+                    <a:lumMod val="75000"/>
+                  </a:schemeClr>
+                </a:solidFill>
+              </a:rPr>
+              <a:t> repo,</a:t>
+            </a:r>
+          </a:p>
+          <a:p>
+            <a:pPr algn="ctr"/>
+            <a:r>
+              <a:rPr lang="fi-FI" dirty="0" err="1">
+                <a:solidFill>
+                  <a:schemeClr val="accent1">
+                    <a:lumMod val="75000"/>
+                  </a:schemeClr>
+                </a:solidFill>
+              </a:rPr>
+              <a:t>e.g</a:t>
+            </a:r>
+            <a:r>
+              <a:rPr lang="fi-FI" dirty="0">
+                <a:solidFill>
+                  <a:schemeClr val="accent1">
+                    <a:lumMod val="75000"/>
+                  </a:schemeClr>
+                </a:solidFill>
+              </a:rPr>
+              <a:t>. </a:t>
+            </a:r>
+            <a:r>
+              <a:rPr lang="fi-FI" dirty="0" err="1">
+                <a:solidFill>
+                  <a:schemeClr val="accent1">
+                    <a:lumMod val="75000"/>
+                  </a:schemeClr>
+                </a:solidFill>
+              </a:rPr>
+              <a:t>your</a:t>
+            </a:r>
+            <a:r>
+              <a:rPr lang="fi-FI" dirty="0">
+                <a:solidFill>
+                  <a:schemeClr val="accent1">
+                    <a:lumMod val="75000"/>
+                  </a:schemeClr>
+                </a:solidFill>
+              </a:rPr>
+              <a:t> </a:t>
+            </a:r>
+            <a:r>
+              <a:rPr lang="fi-FI" dirty="0" err="1">
+                <a:solidFill>
+                  <a:schemeClr val="accent1">
+                    <a:lumMod val="75000"/>
+                  </a:schemeClr>
+                </a:solidFill>
+              </a:rPr>
+              <a:t>laptop</a:t>
+            </a:r>
+            <a:r>
+              <a:rPr lang="fi-FI" dirty="0">
+                <a:solidFill>
+                  <a:schemeClr val="accent1">
+                    <a:lumMod val="75000"/>
+                  </a:schemeClr>
+                </a:solidFill>
+              </a:rPr>
+              <a:t> in </a:t>
+            </a:r>
+            <a:r>
+              <a:rPr lang="fi-FI" dirty="0" err="1">
+                <a:solidFill>
+                  <a:schemeClr val="accent1">
+                    <a:lumMod val="75000"/>
+                  </a:schemeClr>
+                </a:solidFill>
+              </a:rPr>
+              <a:t>train</a:t>
+            </a:r>
+            <a:r>
+              <a:rPr lang="fi-FI" dirty="0">
+                <a:solidFill>
+                  <a:schemeClr val="accent1">
+                    <a:lumMod val="75000"/>
+                  </a:schemeClr>
+                </a:solidFill>
+              </a:rPr>
+              <a:t> </a:t>
+            </a:r>
+          </a:p>
+        </p:txBody>
+      </p:sp>
+      <p:sp>
+        <p:nvSpPr>
+          <p:cNvPr id="6" name="Rectangle 5">
+            <a:extLst>
+              <a:ext uri="{FF2B5EF4-FFF2-40B4-BE49-F238E27FC236}">
+                <a16:creationId xmlns:a16="http://schemas.microsoft.com/office/drawing/2014/main" id="{8A412008-8C4D-4A13-8DA7-007A7DF4A0B9}"/>
+              </a:ext>
+            </a:extLst>
+          </p:cNvPr>
+          <p:cNvSpPr/>
+          <p:nvPr/>
+        </p:nvSpPr>
+        <p:spPr>
+          <a:xfrm>
+            <a:off x="2211055" y="232370"/>
+            <a:ext cx="4732005" cy="2797909"/>
+          </a:xfrm>
+          <a:prstGeom prst="rect">
+            <a:avLst/>
+          </a:prstGeom>
+          <a:noFill/>
+        </p:spPr>
+        <p:style>
+          <a:lnRef idx="2">
+            <a:schemeClr val="accent1">
+              <a:shade val="50000"/>
+            </a:schemeClr>
+          </a:lnRef>
+          <a:fillRef idx="1">
+            <a:schemeClr val="accent1"/>
+          </a:fillRef>
+          <a:effectRef idx="0">
+            <a:schemeClr val="accent1"/>
+          </a:effectRef>
+          <a:fontRef idx="minor">
+            <a:schemeClr val="lt1"/>
+          </a:fontRef>
+        </p:style>
+        <p:txBody>
+          <a:bodyPr rtlCol="0" anchor="t" anchorCtr="0"/>
+          <a:lstStyle/>
+          <a:p>
+            <a:pPr algn="ctr"/>
+            <a:r>
+              <a:rPr lang="fi-FI" dirty="0">
+                <a:solidFill>
+                  <a:schemeClr val="accent1">
+                    <a:lumMod val="75000"/>
+                  </a:schemeClr>
+                </a:solidFill>
+              </a:rPr>
+              <a:t>branch </a:t>
+            </a:r>
+            <a:r>
+              <a:rPr lang="fi-FI" b="1" dirty="0">
+                <a:solidFill>
+                  <a:schemeClr val="accent1">
+                    <a:lumMod val="75000"/>
+                  </a:schemeClr>
+                </a:solidFill>
+              </a:rPr>
+              <a:t>main</a:t>
+            </a:r>
+          </a:p>
+        </p:txBody>
+      </p:sp>
+      <p:sp>
+        <p:nvSpPr>
+          <p:cNvPr id="7" name="Rectangle 6">
+            <a:extLst>
+              <a:ext uri="{FF2B5EF4-FFF2-40B4-BE49-F238E27FC236}">
+                <a16:creationId xmlns:a16="http://schemas.microsoft.com/office/drawing/2014/main" id="{2B19E39D-A7D6-4B59-AB77-367C5134C068}"/>
+              </a:ext>
+            </a:extLst>
+          </p:cNvPr>
+          <p:cNvSpPr/>
+          <p:nvPr/>
+        </p:nvSpPr>
+        <p:spPr>
+          <a:xfrm>
+            <a:off x="6943060" y="232370"/>
+            <a:ext cx="4732005" cy="2797909"/>
+          </a:xfrm>
+          <a:prstGeom prst="rect">
+            <a:avLst/>
+          </a:prstGeom>
+          <a:noFill/>
+        </p:spPr>
+        <p:style>
+          <a:lnRef idx="2">
+            <a:schemeClr val="accent1">
+              <a:shade val="50000"/>
+            </a:schemeClr>
+          </a:lnRef>
+          <a:fillRef idx="1">
+            <a:schemeClr val="accent1"/>
+          </a:fillRef>
+          <a:effectRef idx="0">
+            <a:schemeClr val="accent1"/>
+          </a:effectRef>
+          <a:fontRef idx="minor">
+            <a:schemeClr val="lt1"/>
+          </a:fontRef>
+        </p:style>
+        <p:txBody>
+          <a:bodyPr rtlCol="0" anchor="t" anchorCtr="0"/>
+          <a:lstStyle/>
+          <a:p>
+            <a:pPr algn="ctr"/>
+            <a:r>
+              <a:rPr lang="fi-FI" dirty="0">
+                <a:solidFill>
+                  <a:schemeClr val="accent1">
+                    <a:lumMod val="75000"/>
+                  </a:schemeClr>
+                </a:solidFill>
+              </a:rPr>
+              <a:t>branch </a:t>
+            </a:r>
+            <a:r>
+              <a:rPr lang="fi-FI" b="1" dirty="0" err="1">
+                <a:solidFill>
+                  <a:schemeClr val="accent1">
+                    <a:lumMod val="75000"/>
+                  </a:schemeClr>
+                </a:solidFill>
+              </a:rPr>
+              <a:t>product-listAll-add-filtering-juhani-liisa</a:t>
+            </a:r>
+            <a:endParaRPr lang="fi-FI" b="1" dirty="0">
+              <a:solidFill>
+                <a:schemeClr val="accent1">
+                  <a:lumMod val="75000"/>
+                </a:schemeClr>
+              </a:solidFill>
+            </a:endParaRPr>
+          </a:p>
+        </p:txBody>
+      </p:sp>
+      <p:sp>
+        <p:nvSpPr>
+          <p:cNvPr id="8" name="Rectangle 7">
+            <a:extLst>
+              <a:ext uri="{FF2B5EF4-FFF2-40B4-BE49-F238E27FC236}">
+                <a16:creationId xmlns:a16="http://schemas.microsoft.com/office/drawing/2014/main" id="{A440A1C6-04C1-4788-8258-69E740C24C40}"/>
+              </a:ext>
+            </a:extLst>
+          </p:cNvPr>
+          <p:cNvSpPr/>
+          <p:nvPr/>
+        </p:nvSpPr>
+        <p:spPr>
+          <a:xfrm>
+            <a:off x="2211055" y="3638333"/>
+            <a:ext cx="4732005" cy="2797909"/>
+          </a:xfrm>
+          <a:prstGeom prst="rect">
+            <a:avLst/>
+          </a:prstGeom>
+          <a:noFill/>
+        </p:spPr>
+        <p:style>
+          <a:lnRef idx="2">
+            <a:schemeClr val="accent1">
+              <a:shade val="50000"/>
+            </a:schemeClr>
+          </a:lnRef>
+          <a:fillRef idx="1">
+            <a:schemeClr val="accent1"/>
+          </a:fillRef>
+          <a:effectRef idx="0">
+            <a:schemeClr val="accent1"/>
+          </a:effectRef>
+          <a:fontRef idx="minor">
+            <a:schemeClr val="lt1"/>
+          </a:fontRef>
+        </p:style>
+        <p:txBody>
+          <a:bodyPr rtlCol="0" anchor="t" anchorCtr="0"/>
+          <a:lstStyle/>
+          <a:p>
+            <a:pPr algn="ctr"/>
+            <a:r>
+              <a:rPr lang="fi-FI" dirty="0">
+                <a:solidFill>
+                  <a:schemeClr val="accent1">
+                    <a:lumMod val="75000"/>
+                  </a:schemeClr>
+                </a:solidFill>
+              </a:rPr>
+              <a:t>branch </a:t>
+            </a:r>
+            <a:r>
+              <a:rPr lang="fi-FI" b="1" dirty="0">
+                <a:solidFill>
+                  <a:schemeClr val="accent1">
+                    <a:lumMod val="75000"/>
+                  </a:schemeClr>
+                </a:solidFill>
+              </a:rPr>
+              <a:t>main                                      </a:t>
+            </a:r>
+          </a:p>
+        </p:txBody>
+      </p:sp>
+      <p:sp>
+        <p:nvSpPr>
+          <p:cNvPr id="9" name="Rectangle 8">
+            <a:extLst>
+              <a:ext uri="{FF2B5EF4-FFF2-40B4-BE49-F238E27FC236}">
+                <a16:creationId xmlns:a16="http://schemas.microsoft.com/office/drawing/2014/main" id="{F0187AF5-DD65-495F-A923-AA613F63719D}"/>
+              </a:ext>
+            </a:extLst>
+          </p:cNvPr>
+          <p:cNvSpPr/>
+          <p:nvPr/>
+        </p:nvSpPr>
+        <p:spPr>
+          <a:xfrm>
+            <a:off x="6943060" y="3638333"/>
+            <a:ext cx="4732005" cy="2797909"/>
+          </a:xfrm>
+          <a:prstGeom prst="rect">
+            <a:avLst/>
+          </a:prstGeom>
+          <a:noFill/>
+        </p:spPr>
+        <p:style>
+          <a:lnRef idx="2">
+            <a:schemeClr val="accent1">
+              <a:shade val="50000"/>
+            </a:schemeClr>
+          </a:lnRef>
+          <a:fillRef idx="1">
+            <a:schemeClr val="accent1"/>
+          </a:fillRef>
+          <a:effectRef idx="0">
+            <a:schemeClr val="accent1"/>
+          </a:effectRef>
+          <a:fontRef idx="minor">
+            <a:schemeClr val="lt1"/>
+          </a:fontRef>
+        </p:style>
+        <p:txBody>
+          <a:bodyPr rtlCol="0" anchor="t" anchorCtr="0"/>
+          <a:lstStyle/>
+          <a:p>
+            <a:pPr algn="ctr"/>
+            <a:r>
+              <a:rPr lang="fi-FI" dirty="0">
+                <a:solidFill>
+                  <a:schemeClr val="accent1">
+                    <a:lumMod val="75000"/>
+                  </a:schemeClr>
+                </a:solidFill>
+              </a:rPr>
+              <a:t>       </a:t>
+            </a:r>
+            <a:r>
+              <a:rPr lang="fi-FI" b="1" dirty="0" err="1">
+                <a:solidFill>
+                  <a:schemeClr val="accent1">
+                    <a:lumMod val="75000"/>
+                  </a:schemeClr>
+                </a:solidFill>
+              </a:rPr>
+              <a:t>product-listAll-add-filtering-juhani-liisa</a:t>
+            </a:r>
+            <a:endParaRPr lang="fi-FI" b="1" dirty="0">
+              <a:solidFill>
+                <a:schemeClr val="accent1">
+                  <a:lumMod val="75000"/>
+                </a:schemeClr>
+              </a:solidFill>
+            </a:endParaRPr>
+          </a:p>
+        </p:txBody>
+      </p:sp>
+      <p:cxnSp>
+        <p:nvCxnSpPr>
+          <p:cNvPr id="13" name="Connector: Elbow 12">
+            <a:extLst>
+              <a:ext uri="{FF2B5EF4-FFF2-40B4-BE49-F238E27FC236}">
+                <a16:creationId xmlns:a16="http://schemas.microsoft.com/office/drawing/2014/main" id="{8CA033E3-B9AE-4A62-A5D9-00ACEB16669D}"/>
+              </a:ext>
+            </a:extLst>
+          </p:cNvPr>
+          <p:cNvCxnSpPr>
+            <a:cxnSpLocks/>
+          </p:cNvCxnSpPr>
+          <p:nvPr/>
+        </p:nvCxnSpPr>
+        <p:spPr>
+          <a:xfrm flipV="1">
+            <a:off x="5720316" y="6166884"/>
+            <a:ext cx="2094614" cy="1"/>
+          </a:xfrm>
+          <a:prstGeom prst="bentConnector3">
+            <a:avLst>
+              <a:gd name="adj1" fmla="val 50000"/>
+            </a:avLst>
+          </a:prstGeom>
+          <a:ln>
+            <a:bevel/>
+            <a:tailEnd type="arrow"/>
+          </a:ln>
+        </p:spPr>
+        <p:style>
+          <a:lnRef idx="1">
+            <a:schemeClr val="accent1"/>
+          </a:lnRef>
+          <a:fillRef idx="0">
+            <a:schemeClr val="accent1"/>
+          </a:fillRef>
+          <a:effectRef idx="0">
+            <a:schemeClr val="accent1"/>
+          </a:effectRef>
+          <a:fontRef idx="minor">
+            <a:schemeClr val="tx1"/>
+          </a:fontRef>
+        </p:style>
+      </p:cxnSp>
+      <p:sp>
+        <p:nvSpPr>
+          <p:cNvPr id="20" name="Rectangle 19">
+            <a:extLst>
+              <a:ext uri="{FF2B5EF4-FFF2-40B4-BE49-F238E27FC236}">
+                <a16:creationId xmlns:a16="http://schemas.microsoft.com/office/drawing/2014/main" id="{CDC2E167-4CAA-4D81-AEDA-9D990502651A}"/>
+              </a:ext>
+            </a:extLst>
+          </p:cNvPr>
+          <p:cNvSpPr/>
+          <p:nvPr/>
+        </p:nvSpPr>
+        <p:spPr>
+          <a:xfrm>
+            <a:off x="4398204" y="5711269"/>
+            <a:ext cx="8956288" cy="369332"/>
+          </a:xfrm>
+          <a:prstGeom prst="rect">
+            <a:avLst/>
+          </a:prstGeom>
+        </p:spPr>
+        <p:txBody>
+          <a:bodyPr wrap="square">
+            <a:spAutoFit/>
+          </a:bodyPr>
+          <a:lstStyle/>
+          <a:p>
+            <a:pPr algn="ctr"/>
+            <a:r>
+              <a:rPr lang="fi-FI" dirty="0">
+                <a:solidFill>
+                  <a:schemeClr val="accent1">
+                    <a:lumMod val="75000"/>
+                  </a:schemeClr>
+                </a:solidFill>
+              </a:rPr>
+              <a:t>git </a:t>
+            </a:r>
+            <a:r>
+              <a:rPr lang="fi-FI" dirty="0" err="1">
+                <a:solidFill>
+                  <a:schemeClr val="accent1">
+                    <a:lumMod val="75000"/>
+                  </a:schemeClr>
+                </a:solidFill>
+              </a:rPr>
+              <a:t>checkout</a:t>
+            </a:r>
+            <a:r>
+              <a:rPr lang="fi-FI" dirty="0">
+                <a:solidFill>
+                  <a:schemeClr val="accent1">
+                    <a:lumMod val="75000"/>
+                  </a:schemeClr>
+                </a:solidFill>
+              </a:rPr>
+              <a:t> -b     </a:t>
+            </a:r>
+            <a:r>
+              <a:rPr lang="fi-FI" dirty="0" err="1">
+                <a:solidFill>
+                  <a:schemeClr val="accent1">
+                    <a:lumMod val="75000"/>
+                  </a:schemeClr>
+                </a:solidFill>
+              </a:rPr>
+              <a:t>product-listAll-add-filtering-juhani-liisa</a:t>
+            </a:r>
+            <a:endParaRPr lang="fi-FI" b="1" dirty="0">
+              <a:solidFill>
+                <a:schemeClr val="accent1">
+                  <a:lumMod val="75000"/>
+                </a:schemeClr>
+              </a:solidFill>
+            </a:endParaRPr>
+          </a:p>
+        </p:txBody>
+      </p:sp>
+      <p:cxnSp>
+        <p:nvCxnSpPr>
+          <p:cNvPr id="21" name="Connector: Elbow 20">
+            <a:extLst>
+              <a:ext uri="{FF2B5EF4-FFF2-40B4-BE49-F238E27FC236}">
+                <a16:creationId xmlns:a16="http://schemas.microsoft.com/office/drawing/2014/main" id="{D62D9E10-3766-448B-B7D0-4B5D38F29F6B}"/>
+              </a:ext>
+            </a:extLst>
+          </p:cNvPr>
+          <p:cNvCxnSpPr>
+            <a:cxnSpLocks/>
+          </p:cNvCxnSpPr>
+          <p:nvPr/>
+        </p:nvCxnSpPr>
+        <p:spPr>
+          <a:xfrm rot="16200000" flipV="1">
+            <a:off x="5182984" y="3296698"/>
+            <a:ext cx="4383829" cy="8193"/>
+          </a:xfrm>
+          <a:prstGeom prst="bentConnector3">
+            <a:avLst>
+              <a:gd name="adj1" fmla="val 50000"/>
+            </a:avLst>
+          </a:prstGeom>
+          <a:ln>
+            <a:prstDash val="dash"/>
+            <a:bevel/>
+            <a:tailEnd type="arrow"/>
+          </a:ln>
+        </p:spPr>
+        <p:style>
+          <a:lnRef idx="1">
+            <a:schemeClr val="accent1"/>
+          </a:lnRef>
+          <a:fillRef idx="0">
+            <a:schemeClr val="accent1"/>
+          </a:fillRef>
+          <a:effectRef idx="0">
+            <a:schemeClr val="accent1"/>
+          </a:effectRef>
+          <a:fontRef idx="minor">
+            <a:schemeClr val="tx1"/>
+          </a:fontRef>
+        </p:style>
+      </p:cxnSp>
+      <p:sp>
+        <p:nvSpPr>
+          <p:cNvPr id="24" name="Rectangle 23">
+            <a:extLst>
+              <a:ext uri="{FF2B5EF4-FFF2-40B4-BE49-F238E27FC236}">
+                <a16:creationId xmlns:a16="http://schemas.microsoft.com/office/drawing/2014/main" id="{7A95E786-3C39-4C48-B8E7-7D970DF4AF64}"/>
+              </a:ext>
+            </a:extLst>
+          </p:cNvPr>
+          <p:cNvSpPr/>
+          <p:nvPr/>
+        </p:nvSpPr>
+        <p:spPr>
+          <a:xfrm rot="16200000">
+            <a:off x="10834837" y="4852620"/>
+            <a:ext cx="984565" cy="369332"/>
+          </a:xfrm>
+          <a:prstGeom prst="rect">
+            <a:avLst/>
+          </a:prstGeom>
+        </p:spPr>
+        <p:txBody>
+          <a:bodyPr wrap="none">
+            <a:spAutoFit/>
+          </a:bodyPr>
+          <a:lstStyle/>
+          <a:p>
+            <a:r>
+              <a:rPr lang="fi-FI" dirty="0">
+                <a:solidFill>
+                  <a:schemeClr val="accent1">
+                    <a:lumMod val="75000"/>
+                  </a:schemeClr>
+                </a:solidFill>
+              </a:rPr>
+              <a:t>git </a:t>
+            </a:r>
+            <a:r>
+              <a:rPr lang="fi-FI" dirty="0" err="1">
+                <a:solidFill>
+                  <a:schemeClr val="accent1">
+                    <a:lumMod val="75000"/>
+                  </a:schemeClr>
+                </a:solidFill>
+              </a:rPr>
+              <a:t>push</a:t>
+            </a:r>
+            <a:r>
+              <a:rPr lang="fi-FI" dirty="0">
+                <a:solidFill>
+                  <a:schemeClr val="accent1">
+                    <a:lumMod val="75000"/>
+                  </a:schemeClr>
+                </a:solidFill>
+              </a:rPr>
+              <a:t> </a:t>
+            </a:r>
+            <a:endParaRPr lang="fi-FI" dirty="0"/>
+          </a:p>
+        </p:txBody>
+      </p:sp>
+      <p:sp>
+        <p:nvSpPr>
+          <p:cNvPr id="28" name="Rectangle 27">
+            <a:extLst>
+              <a:ext uri="{FF2B5EF4-FFF2-40B4-BE49-F238E27FC236}">
+                <a16:creationId xmlns:a16="http://schemas.microsoft.com/office/drawing/2014/main" id="{744B130D-333B-4EAE-B9A9-3A85DEB332E8}"/>
+              </a:ext>
+            </a:extLst>
+          </p:cNvPr>
+          <p:cNvSpPr/>
+          <p:nvPr/>
+        </p:nvSpPr>
+        <p:spPr>
+          <a:xfrm>
+            <a:off x="9494194" y="5363557"/>
+            <a:ext cx="2059859" cy="369332"/>
+          </a:xfrm>
+          <a:prstGeom prst="rect">
+            <a:avLst/>
+          </a:prstGeom>
+        </p:spPr>
+        <p:txBody>
+          <a:bodyPr wrap="none">
+            <a:spAutoFit/>
+          </a:bodyPr>
+          <a:lstStyle/>
+          <a:p>
+            <a:r>
+              <a:rPr lang="fi-FI" dirty="0">
+                <a:solidFill>
+                  <a:schemeClr val="accent1">
+                    <a:lumMod val="75000"/>
+                  </a:schemeClr>
+                </a:solidFill>
+              </a:rPr>
+              <a:t>git </a:t>
+            </a:r>
+            <a:r>
+              <a:rPr lang="fi-FI" dirty="0" err="1">
+                <a:solidFill>
+                  <a:schemeClr val="accent1">
+                    <a:lumMod val="75000"/>
+                  </a:schemeClr>
+                </a:solidFill>
+              </a:rPr>
+              <a:t>add</a:t>
+            </a:r>
+            <a:r>
+              <a:rPr lang="fi-FI" dirty="0">
+                <a:solidFill>
+                  <a:schemeClr val="accent1">
+                    <a:lumMod val="75000"/>
+                  </a:schemeClr>
+                </a:solidFill>
+              </a:rPr>
+              <a:t>, git </a:t>
+            </a:r>
+            <a:r>
+              <a:rPr lang="fi-FI" dirty="0" err="1">
+                <a:solidFill>
+                  <a:schemeClr val="accent1">
+                    <a:lumMod val="75000"/>
+                  </a:schemeClr>
+                </a:solidFill>
+              </a:rPr>
+              <a:t>commit</a:t>
+            </a:r>
+            <a:r>
+              <a:rPr lang="fi-FI" dirty="0">
+                <a:solidFill>
+                  <a:schemeClr val="accent1">
+                    <a:lumMod val="75000"/>
+                  </a:schemeClr>
+                </a:solidFill>
+              </a:rPr>
+              <a:t>, </a:t>
+            </a:r>
+            <a:endParaRPr lang="fi-FI" dirty="0"/>
+          </a:p>
+        </p:txBody>
+      </p:sp>
+      <p:cxnSp>
+        <p:nvCxnSpPr>
+          <p:cNvPr id="30" name="Connector: Elbow 29">
+            <a:extLst>
+              <a:ext uri="{FF2B5EF4-FFF2-40B4-BE49-F238E27FC236}">
+                <a16:creationId xmlns:a16="http://schemas.microsoft.com/office/drawing/2014/main" id="{1CB185D6-9B5B-419A-B244-9AA3F43B402D}"/>
+              </a:ext>
+            </a:extLst>
+          </p:cNvPr>
+          <p:cNvCxnSpPr>
+            <a:cxnSpLocks/>
+          </p:cNvCxnSpPr>
+          <p:nvPr/>
+        </p:nvCxnSpPr>
+        <p:spPr>
+          <a:xfrm rot="5400000" flipH="1" flipV="1">
+            <a:off x="9162327" y="3164819"/>
+            <a:ext cx="4715307" cy="1"/>
+          </a:xfrm>
+          <a:prstGeom prst="bentConnector3">
+            <a:avLst>
+              <a:gd name="adj1" fmla="val 50000"/>
+            </a:avLst>
+          </a:prstGeom>
+          <a:ln>
+            <a:prstDash val="solid"/>
+            <a:bevel/>
+            <a:tailEnd type="arrow"/>
+          </a:ln>
+        </p:spPr>
+        <p:style>
+          <a:lnRef idx="1">
+            <a:schemeClr val="accent1"/>
+          </a:lnRef>
+          <a:fillRef idx="0">
+            <a:schemeClr val="accent1"/>
+          </a:fillRef>
+          <a:effectRef idx="0">
+            <a:schemeClr val="accent1"/>
+          </a:effectRef>
+          <a:fontRef idx="minor">
+            <a:schemeClr val="tx1"/>
+          </a:fontRef>
+        </p:style>
+      </p:cxnSp>
+      <p:sp>
+        <p:nvSpPr>
+          <p:cNvPr id="31" name="Rectangle 30">
+            <a:extLst>
+              <a:ext uri="{FF2B5EF4-FFF2-40B4-BE49-F238E27FC236}">
+                <a16:creationId xmlns:a16="http://schemas.microsoft.com/office/drawing/2014/main" id="{00E86EF1-123C-46E7-9CA5-5A1E29C3EF4F}"/>
+              </a:ext>
+            </a:extLst>
+          </p:cNvPr>
+          <p:cNvSpPr/>
+          <p:nvPr/>
+        </p:nvSpPr>
+        <p:spPr>
+          <a:xfrm rot="16200000">
+            <a:off x="4878356" y="3131011"/>
+            <a:ext cx="4615559" cy="369332"/>
+          </a:xfrm>
+          <a:prstGeom prst="rect">
+            <a:avLst/>
+          </a:prstGeom>
+        </p:spPr>
+        <p:txBody>
+          <a:bodyPr wrap="none">
+            <a:spAutoFit/>
+          </a:bodyPr>
+          <a:lstStyle/>
+          <a:p>
+            <a:r>
+              <a:rPr lang="fi-FI" dirty="0">
+                <a:solidFill>
+                  <a:schemeClr val="accent1">
+                    <a:lumMod val="75000"/>
+                  </a:schemeClr>
+                </a:solidFill>
+              </a:rPr>
+              <a:t>git </a:t>
+            </a:r>
+            <a:r>
+              <a:rPr lang="fi-FI" dirty="0" err="1">
+                <a:solidFill>
+                  <a:schemeClr val="accent1">
+                    <a:lumMod val="75000"/>
+                  </a:schemeClr>
+                </a:solidFill>
+              </a:rPr>
+              <a:t>push</a:t>
+            </a:r>
+            <a:r>
+              <a:rPr lang="fi-FI" dirty="0">
+                <a:solidFill>
+                  <a:schemeClr val="accent1">
+                    <a:lumMod val="75000"/>
+                  </a:schemeClr>
+                </a:solidFill>
+              </a:rPr>
+              <a:t> --set-</a:t>
+            </a:r>
+            <a:r>
+              <a:rPr lang="fi-FI" dirty="0" err="1">
+                <a:solidFill>
+                  <a:schemeClr val="accent1">
+                    <a:lumMod val="75000"/>
+                  </a:schemeClr>
+                </a:solidFill>
+              </a:rPr>
+              <a:t>upstream</a:t>
+            </a:r>
+            <a:r>
+              <a:rPr lang="fi-FI" dirty="0">
+                <a:solidFill>
+                  <a:schemeClr val="accent1">
+                    <a:lumMod val="75000"/>
+                  </a:schemeClr>
+                </a:solidFill>
+              </a:rPr>
+              <a:t> </a:t>
+            </a:r>
+            <a:r>
+              <a:rPr lang="fi-FI" dirty="0" err="1">
+                <a:solidFill>
+                  <a:schemeClr val="accent1">
+                    <a:lumMod val="75000"/>
+                  </a:schemeClr>
+                </a:solidFill>
+              </a:rPr>
+              <a:t>origin</a:t>
+            </a:r>
+            <a:r>
+              <a:rPr lang="fi-FI" dirty="0">
+                <a:solidFill>
+                  <a:schemeClr val="accent1">
+                    <a:lumMod val="75000"/>
+                  </a:schemeClr>
+                </a:solidFill>
+              </a:rPr>
+              <a:t> </a:t>
+            </a:r>
+            <a:r>
+              <a:rPr lang="fi-FI">
+                <a:solidFill>
+                  <a:schemeClr val="accent1">
+                    <a:lumMod val="75000"/>
+                  </a:schemeClr>
+                </a:solidFill>
+              </a:rPr>
+              <a:t>product-listAll</a:t>
+            </a:r>
+            <a:r>
+              <a:rPr lang="fi-FI" dirty="0">
+                <a:solidFill>
+                  <a:schemeClr val="accent1">
+                    <a:lumMod val="75000"/>
+                  </a:schemeClr>
+                </a:solidFill>
+              </a:rPr>
+              <a:t>-… </a:t>
+            </a:r>
+            <a:endParaRPr lang="fi-FI" dirty="0"/>
+          </a:p>
+        </p:txBody>
+      </p:sp>
+      <p:sp>
+        <p:nvSpPr>
+          <p:cNvPr id="32" name="Rectangle 31">
+            <a:extLst>
+              <a:ext uri="{FF2B5EF4-FFF2-40B4-BE49-F238E27FC236}">
+                <a16:creationId xmlns:a16="http://schemas.microsoft.com/office/drawing/2014/main" id="{C594F5EA-CD9C-457E-AAEF-921DEC4A5461}"/>
+              </a:ext>
+            </a:extLst>
+          </p:cNvPr>
+          <p:cNvSpPr/>
+          <p:nvPr/>
+        </p:nvSpPr>
+        <p:spPr>
+          <a:xfrm>
+            <a:off x="5380074" y="232370"/>
+            <a:ext cx="1562985" cy="687715"/>
+          </a:xfrm>
+          <a:prstGeom prst="rect">
+            <a:avLst/>
+          </a:prstGeom>
+          <a:noFill/>
+        </p:spPr>
+        <p:style>
+          <a:lnRef idx="2">
+            <a:schemeClr val="accent1">
+              <a:shade val="50000"/>
+            </a:schemeClr>
+          </a:lnRef>
+          <a:fillRef idx="1">
+            <a:schemeClr val="accent1"/>
+          </a:fillRef>
+          <a:effectRef idx="0">
+            <a:schemeClr val="accent1"/>
+          </a:effectRef>
+          <a:fontRef idx="minor">
+            <a:schemeClr val="lt1"/>
+          </a:fontRef>
+        </p:style>
+        <p:txBody>
+          <a:bodyPr rtlCol="0" anchor="t" anchorCtr="0"/>
+          <a:lstStyle/>
+          <a:p>
+            <a:pPr algn="ctr"/>
+            <a:r>
+              <a:rPr lang="fi-FI" dirty="0" err="1">
+                <a:solidFill>
+                  <a:schemeClr val="accent1">
+                    <a:lumMod val="75000"/>
+                  </a:schemeClr>
+                </a:solidFill>
+              </a:rPr>
+              <a:t>Pull</a:t>
+            </a:r>
+            <a:r>
+              <a:rPr lang="fi-FI" dirty="0">
+                <a:solidFill>
+                  <a:schemeClr val="accent1">
+                    <a:lumMod val="75000"/>
+                  </a:schemeClr>
+                </a:solidFill>
+              </a:rPr>
+              <a:t> </a:t>
+            </a:r>
+            <a:r>
+              <a:rPr lang="fi-FI" dirty="0" err="1">
+                <a:solidFill>
+                  <a:schemeClr val="accent1">
+                    <a:lumMod val="75000"/>
+                  </a:schemeClr>
+                </a:solidFill>
+              </a:rPr>
+              <a:t>request</a:t>
+            </a:r>
+            <a:r>
+              <a:rPr lang="fi-FI" dirty="0">
+                <a:solidFill>
+                  <a:schemeClr val="accent1">
+                    <a:lumMod val="75000"/>
+                  </a:schemeClr>
+                </a:solidFill>
+              </a:rPr>
+              <a:t> (i)</a:t>
+            </a:r>
+          </a:p>
+        </p:txBody>
+      </p:sp>
+      <p:sp>
+        <p:nvSpPr>
+          <p:cNvPr id="33" name="Rectangle 32">
+            <a:extLst>
+              <a:ext uri="{FF2B5EF4-FFF2-40B4-BE49-F238E27FC236}">
+                <a16:creationId xmlns:a16="http://schemas.microsoft.com/office/drawing/2014/main" id="{BB4ECC30-B630-4A8B-B393-3B81B54A3BB9}"/>
+              </a:ext>
+            </a:extLst>
+          </p:cNvPr>
+          <p:cNvSpPr/>
+          <p:nvPr/>
+        </p:nvSpPr>
+        <p:spPr>
+          <a:xfrm>
+            <a:off x="5170619" y="765023"/>
+            <a:ext cx="1326938" cy="687715"/>
+          </a:xfrm>
+          <a:prstGeom prst="rect">
+            <a:avLst/>
+          </a:prstGeom>
+          <a:solidFill>
+            <a:schemeClr val="bg1"/>
+          </a:solidFill>
+        </p:spPr>
+        <p:style>
+          <a:lnRef idx="2">
+            <a:schemeClr val="accent1">
+              <a:shade val="50000"/>
+            </a:schemeClr>
+          </a:lnRef>
+          <a:fillRef idx="1">
+            <a:schemeClr val="accent1"/>
+          </a:fillRef>
+          <a:effectRef idx="0">
+            <a:schemeClr val="accent1"/>
+          </a:effectRef>
+          <a:fontRef idx="minor">
+            <a:schemeClr val="lt1"/>
+          </a:fontRef>
+        </p:style>
+        <p:txBody>
+          <a:bodyPr rtlCol="0" anchor="t" anchorCtr="0"/>
+          <a:lstStyle/>
+          <a:p>
+            <a:pPr algn="ctr"/>
+            <a:r>
+              <a:rPr lang="fi-FI" dirty="0" err="1">
+                <a:solidFill>
+                  <a:schemeClr val="accent1">
+                    <a:lumMod val="75000"/>
+                  </a:schemeClr>
+                </a:solidFill>
+              </a:rPr>
+              <a:t>Review</a:t>
+            </a:r>
+            <a:r>
+              <a:rPr lang="fi-FI" dirty="0">
+                <a:solidFill>
+                  <a:schemeClr val="accent1">
+                    <a:lumMod val="75000"/>
+                  </a:schemeClr>
+                </a:solidFill>
+              </a:rPr>
+              <a:t> (ii)</a:t>
+            </a:r>
+          </a:p>
+        </p:txBody>
+      </p:sp>
+      <p:cxnSp>
+        <p:nvCxnSpPr>
+          <p:cNvPr id="36" name="Connector: Elbow 35">
+            <a:extLst>
+              <a:ext uri="{FF2B5EF4-FFF2-40B4-BE49-F238E27FC236}">
+                <a16:creationId xmlns:a16="http://schemas.microsoft.com/office/drawing/2014/main" id="{139957EF-7619-497A-8C5C-AE079F2857FF}"/>
+              </a:ext>
+            </a:extLst>
+          </p:cNvPr>
+          <p:cNvCxnSpPr>
+            <a:cxnSpLocks/>
+          </p:cNvCxnSpPr>
+          <p:nvPr/>
+        </p:nvCxnSpPr>
+        <p:spPr>
+          <a:xfrm rot="10800000" flipV="1">
+            <a:off x="6757475" y="691115"/>
+            <a:ext cx="3766649" cy="1"/>
+          </a:xfrm>
+          <a:prstGeom prst="bentConnector3">
+            <a:avLst>
+              <a:gd name="adj1" fmla="val 50000"/>
+            </a:avLst>
+          </a:prstGeom>
+          <a:ln>
+            <a:prstDash val="solid"/>
+            <a:bevel/>
+            <a:tailEnd type="arrow"/>
+          </a:ln>
+        </p:spPr>
+        <p:style>
+          <a:lnRef idx="1">
+            <a:schemeClr val="accent1"/>
+          </a:lnRef>
+          <a:fillRef idx="0">
+            <a:schemeClr val="accent1"/>
+          </a:fillRef>
+          <a:effectRef idx="0">
+            <a:schemeClr val="accent1"/>
+          </a:effectRef>
+          <a:fontRef idx="minor">
+            <a:schemeClr val="tx1"/>
+          </a:fontRef>
+        </p:style>
+      </p:cxnSp>
+      <p:sp>
+        <p:nvSpPr>
+          <p:cNvPr id="41" name="Rectangle 40">
+            <a:extLst>
+              <a:ext uri="{FF2B5EF4-FFF2-40B4-BE49-F238E27FC236}">
+                <a16:creationId xmlns:a16="http://schemas.microsoft.com/office/drawing/2014/main" id="{F0DEF219-CF1B-46F5-A036-DB1C180A89DB}"/>
+              </a:ext>
+            </a:extLst>
+          </p:cNvPr>
+          <p:cNvSpPr/>
+          <p:nvPr/>
+        </p:nvSpPr>
+        <p:spPr>
+          <a:xfrm>
+            <a:off x="7548751" y="691114"/>
+            <a:ext cx="3365537" cy="369332"/>
+          </a:xfrm>
+          <a:prstGeom prst="rect">
+            <a:avLst/>
+          </a:prstGeom>
+        </p:spPr>
+        <p:txBody>
+          <a:bodyPr wrap="none">
+            <a:spAutoFit/>
+          </a:bodyPr>
+          <a:lstStyle/>
+          <a:p>
+            <a:r>
+              <a:rPr lang="fi-FI" dirty="0">
+                <a:solidFill>
+                  <a:schemeClr val="accent1">
+                    <a:lumMod val="75000"/>
+                  </a:schemeClr>
+                </a:solidFill>
+              </a:rPr>
+              <a:t>Make a </a:t>
+            </a:r>
+            <a:r>
+              <a:rPr lang="fi-FI" dirty="0" err="1">
+                <a:solidFill>
+                  <a:schemeClr val="accent1">
+                    <a:lumMod val="75000"/>
+                  </a:schemeClr>
+                </a:solidFill>
+              </a:rPr>
+              <a:t>Pull</a:t>
+            </a:r>
+            <a:r>
+              <a:rPr lang="fi-FI" dirty="0">
+                <a:solidFill>
+                  <a:schemeClr val="accent1">
+                    <a:lumMod val="75000"/>
+                  </a:schemeClr>
+                </a:solidFill>
+              </a:rPr>
+              <a:t> </a:t>
+            </a:r>
+            <a:r>
+              <a:rPr lang="fi-FI" dirty="0" err="1">
+                <a:solidFill>
+                  <a:schemeClr val="accent1">
+                    <a:lumMod val="75000"/>
+                  </a:schemeClr>
+                </a:solidFill>
+              </a:rPr>
+              <a:t>request</a:t>
+            </a:r>
+            <a:r>
+              <a:rPr lang="fi-FI" dirty="0">
+                <a:solidFill>
+                  <a:schemeClr val="accent1">
+                    <a:lumMod val="75000"/>
+                  </a:schemeClr>
+                </a:solidFill>
+              </a:rPr>
+              <a:t> in GitHub </a:t>
+            </a:r>
+            <a:r>
+              <a:rPr lang="fi-FI" dirty="0" err="1">
+                <a:solidFill>
+                  <a:schemeClr val="accent1">
+                    <a:lumMod val="75000"/>
+                  </a:schemeClr>
+                </a:solidFill>
+              </a:rPr>
+              <a:t>site</a:t>
+            </a:r>
+            <a:endParaRPr lang="fi-FI" dirty="0"/>
+          </a:p>
+        </p:txBody>
+      </p:sp>
+      <p:cxnSp>
+        <p:nvCxnSpPr>
+          <p:cNvPr id="45" name="Straight Arrow Connector 44">
+            <a:extLst>
+              <a:ext uri="{FF2B5EF4-FFF2-40B4-BE49-F238E27FC236}">
+                <a16:creationId xmlns:a16="http://schemas.microsoft.com/office/drawing/2014/main" id="{96464082-F916-4AD6-8B4E-41BE77E7C52F}"/>
+              </a:ext>
+            </a:extLst>
+          </p:cNvPr>
+          <p:cNvCxnSpPr>
+            <a:cxnSpLocks/>
+          </p:cNvCxnSpPr>
+          <p:nvPr/>
+        </p:nvCxnSpPr>
+        <p:spPr>
+          <a:xfrm flipH="1">
+            <a:off x="6265244" y="678740"/>
+            <a:ext cx="337147" cy="459905"/>
+          </a:xfrm>
+          <a:prstGeom prst="straightConnector1">
+            <a:avLst/>
+          </a:prstGeom>
+          <a:ln>
+            <a:tailEnd type="arrow"/>
+          </a:ln>
+        </p:spPr>
+        <p:style>
+          <a:lnRef idx="1">
+            <a:schemeClr val="accent1"/>
+          </a:lnRef>
+          <a:fillRef idx="0">
+            <a:schemeClr val="accent1"/>
+          </a:fillRef>
+          <a:effectRef idx="0">
+            <a:schemeClr val="accent1"/>
+          </a:effectRef>
+          <a:fontRef idx="minor">
+            <a:schemeClr val="tx1"/>
+          </a:fontRef>
+        </p:style>
+      </p:cxnSp>
+      <p:cxnSp>
+        <p:nvCxnSpPr>
+          <p:cNvPr id="47" name="Straight Arrow Connector 46">
+            <a:extLst>
+              <a:ext uri="{FF2B5EF4-FFF2-40B4-BE49-F238E27FC236}">
+                <a16:creationId xmlns:a16="http://schemas.microsoft.com/office/drawing/2014/main" id="{992DE8B1-3D22-42AB-AA7E-94F23279C426}"/>
+              </a:ext>
+            </a:extLst>
+          </p:cNvPr>
+          <p:cNvCxnSpPr>
+            <a:cxnSpLocks/>
+          </p:cNvCxnSpPr>
+          <p:nvPr/>
+        </p:nvCxnSpPr>
+        <p:spPr>
+          <a:xfrm flipH="1" flipV="1">
+            <a:off x="4752753" y="765023"/>
+            <a:ext cx="692928" cy="496257"/>
+          </a:xfrm>
+          <a:prstGeom prst="straightConnector1">
+            <a:avLst/>
+          </a:prstGeom>
+          <a:ln>
+            <a:tailEnd type="arrow"/>
+          </a:ln>
+        </p:spPr>
+        <p:style>
+          <a:lnRef idx="1">
+            <a:schemeClr val="accent1"/>
+          </a:lnRef>
+          <a:fillRef idx="0">
+            <a:schemeClr val="accent1"/>
+          </a:fillRef>
+          <a:effectRef idx="0">
+            <a:schemeClr val="accent1"/>
+          </a:effectRef>
+          <a:fontRef idx="minor">
+            <a:schemeClr val="tx1"/>
+          </a:fontRef>
+        </p:style>
+      </p:cxnSp>
+      <p:sp>
+        <p:nvSpPr>
+          <p:cNvPr id="50" name="Rectangle 49">
+            <a:extLst>
+              <a:ext uri="{FF2B5EF4-FFF2-40B4-BE49-F238E27FC236}">
+                <a16:creationId xmlns:a16="http://schemas.microsoft.com/office/drawing/2014/main" id="{3B83DCFC-8FF9-4854-96DE-057E9B8CF2C1}"/>
+              </a:ext>
+            </a:extLst>
+          </p:cNvPr>
+          <p:cNvSpPr/>
+          <p:nvPr/>
+        </p:nvSpPr>
+        <p:spPr>
+          <a:xfrm rot="2292504">
+            <a:off x="4382186" y="989064"/>
+            <a:ext cx="1149417" cy="369332"/>
+          </a:xfrm>
+          <a:prstGeom prst="rect">
+            <a:avLst/>
+          </a:prstGeom>
+        </p:spPr>
+        <p:txBody>
+          <a:bodyPr wrap="none">
+            <a:spAutoFit/>
+          </a:bodyPr>
+          <a:lstStyle/>
+          <a:p>
+            <a:r>
+              <a:rPr lang="fi-FI" dirty="0" err="1">
+                <a:solidFill>
+                  <a:schemeClr val="accent1">
+                    <a:lumMod val="75000"/>
+                  </a:schemeClr>
+                </a:solidFill>
+              </a:rPr>
+              <a:t>Merge</a:t>
+            </a:r>
+            <a:r>
+              <a:rPr lang="fi-FI" dirty="0">
+                <a:solidFill>
+                  <a:schemeClr val="accent1">
+                    <a:lumMod val="75000"/>
+                  </a:schemeClr>
+                </a:solidFill>
+              </a:rPr>
+              <a:t> (iii)</a:t>
+            </a:r>
+            <a:endParaRPr lang="fi-FI" dirty="0"/>
+          </a:p>
+        </p:txBody>
+      </p:sp>
+      <p:sp>
+        <p:nvSpPr>
+          <p:cNvPr id="51" name="Rectangle 50">
+            <a:extLst>
+              <a:ext uri="{FF2B5EF4-FFF2-40B4-BE49-F238E27FC236}">
+                <a16:creationId xmlns:a16="http://schemas.microsoft.com/office/drawing/2014/main" id="{2563F8D1-8F16-4205-9134-A075894AC23B}"/>
+              </a:ext>
+            </a:extLst>
+          </p:cNvPr>
+          <p:cNvSpPr/>
+          <p:nvPr/>
+        </p:nvSpPr>
+        <p:spPr>
+          <a:xfrm>
+            <a:off x="5461849" y="1096143"/>
+            <a:ext cx="803395" cy="369332"/>
+          </a:xfrm>
+          <a:prstGeom prst="rect">
+            <a:avLst/>
+          </a:prstGeom>
+        </p:spPr>
+        <p:txBody>
+          <a:bodyPr wrap="square">
+            <a:spAutoFit/>
+          </a:bodyPr>
+          <a:lstStyle/>
+          <a:p>
+            <a:r>
+              <a:rPr lang="fi-FI" dirty="0" err="1">
+                <a:solidFill>
+                  <a:schemeClr val="accent1">
+                    <a:lumMod val="75000"/>
+                  </a:schemeClr>
+                </a:solidFill>
+              </a:rPr>
+              <a:t>accept</a:t>
+            </a:r>
+            <a:endParaRPr lang="fi-FI" dirty="0"/>
+          </a:p>
+        </p:txBody>
+      </p:sp>
+      <p:cxnSp>
+        <p:nvCxnSpPr>
+          <p:cNvPr id="53" name="Straight Arrow Connector 52">
+            <a:extLst>
+              <a:ext uri="{FF2B5EF4-FFF2-40B4-BE49-F238E27FC236}">
+                <a16:creationId xmlns:a16="http://schemas.microsoft.com/office/drawing/2014/main" id="{3677EA66-801B-4E5F-898D-81F12C48261E}"/>
+              </a:ext>
+            </a:extLst>
+          </p:cNvPr>
+          <p:cNvCxnSpPr>
+            <a:cxnSpLocks/>
+          </p:cNvCxnSpPr>
+          <p:nvPr/>
+        </p:nvCxnSpPr>
+        <p:spPr>
+          <a:xfrm flipH="1">
+            <a:off x="2695539" y="908692"/>
+            <a:ext cx="17923" cy="4563111"/>
+          </a:xfrm>
+          <a:prstGeom prst="straightConnector1">
+            <a:avLst/>
+          </a:prstGeom>
+          <a:ln>
+            <a:tailEnd type="arrow"/>
+          </a:ln>
+        </p:spPr>
+        <p:style>
+          <a:lnRef idx="1">
+            <a:schemeClr val="accent1"/>
+          </a:lnRef>
+          <a:fillRef idx="0">
+            <a:schemeClr val="accent1"/>
+          </a:fillRef>
+          <a:effectRef idx="0">
+            <a:schemeClr val="accent1"/>
+          </a:effectRef>
+          <a:fontRef idx="minor">
+            <a:schemeClr val="tx1"/>
+          </a:fontRef>
+        </p:style>
+      </p:cxnSp>
+      <p:sp>
+        <p:nvSpPr>
+          <p:cNvPr id="58" name="Rectangle 57">
+            <a:extLst>
+              <a:ext uri="{FF2B5EF4-FFF2-40B4-BE49-F238E27FC236}">
+                <a16:creationId xmlns:a16="http://schemas.microsoft.com/office/drawing/2014/main" id="{758FE404-0616-49AB-8D43-E1DB9FB73B10}"/>
+              </a:ext>
+            </a:extLst>
+          </p:cNvPr>
+          <p:cNvSpPr/>
+          <p:nvPr/>
+        </p:nvSpPr>
+        <p:spPr>
+          <a:xfrm rot="16200000">
+            <a:off x="352711" y="2980153"/>
+            <a:ext cx="4339521" cy="369332"/>
+          </a:xfrm>
+          <a:prstGeom prst="rect">
+            <a:avLst/>
+          </a:prstGeom>
+        </p:spPr>
+        <p:txBody>
+          <a:bodyPr wrap="none">
+            <a:spAutoFit/>
+          </a:bodyPr>
+          <a:lstStyle/>
+          <a:p>
+            <a:r>
+              <a:rPr lang="fi-FI" dirty="0">
+                <a:solidFill>
+                  <a:schemeClr val="accent1">
+                    <a:lumMod val="75000"/>
+                  </a:schemeClr>
+                </a:solidFill>
+              </a:rPr>
+              <a:t>git </a:t>
+            </a:r>
+            <a:r>
+              <a:rPr lang="fi-FI" dirty="0" err="1">
+                <a:solidFill>
+                  <a:schemeClr val="accent1">
+                    <a:lumMod val="75000"/>
+                  </a:schemeClr>
+                </a:solidFill>
+              </a:rPr>
+              <a:t>pull</a:t>
+            </a:r>
+            <a:r>
+              <a:rPr lang="fi-FI" dirty="0">
+                <a:solidFill>
+                  <a:schemeClr val="accent1">
+                    <a:lumMod val="75000"/>
+                  </a:schemeClr>
+                </a:solidFill>
+              </a:rPr>
+              <a:t>, (</a:t>
+            </a:r>
+            <a:r>
+              <a:rPr lang="fi-FI" dirty="0" err="1">
+                <a:solidFill>
+                  <a:schemeClr val="accent1">
+                    <a:lumMod val="75000"/>
+                  </a:schemeClr>
+                </a:solidFill>
+              </a:rPr>
+              <a:t>read</a:t>
+            </a:r>
+            <a:r>
+              <a:rPr lang="fi-FI" dirty="0">
+                <a:solidFill>
+                  <a:schemeClr val="accent1">
+                    <a:lumMod val="75000"/>
+                  </a:schemeClr>
+                </a:solidFill>
+              </a:rPr>
+              <a:t> </a:t>
+            </a:r>
+            <a:r>
+              <a:rPr lang="fi-FI" dirty="0" err="1">
+                <a:solidFill>
+                  <a:schemeClr val="accent1">
+                    <a:lumMod val="75000"/>
+                  </a:schemeClr>
+                </a:solidFill>
+              </a:rPr>
+              <a:t>code</a:t>
+            </a:r>
+            <a:r>
+              <a:rPr lang="fi-FI" dirty="0">
+                <a:solidFill>
+                  <a:schemeClr val="accent1">
+                    <a:lumMod val="75000"/>
+                  </a:schemeClr>
+                </a:solidFill>
+              </a:rPr>
+              <a:t>), git </a:t>
+            </a:r>
+            <a:r>
+              <a:rPr lang="fi-FI" dirty="0" err="1">
+                <a:solidFill>
+                  <a:schemeClr val="accent1">
+                    <a:lumMod val="75000"/>
+                  </a:schemeClr>
+                </a:solidFill>
+              </a:rPr>
+              <a:t>pull</a:t>
+            </a:r>
+            <a:r>
+              <a:rPr lang="fi-FI" dirty="0">
+                <a:solidFill>
+                  <a:schemeClr val="accent1">
+                    <a:lumMod val="75000"/>
+                  </a:schemeClr>
+                </a:solidFill>
+              </a:rPr>
+              <a:t>, (</a:t>
+            </a:r>
+            <a:r>
+              <a:rPr lang="fi-FI" dirty="0" err="1">
+                <a:solidFill>
+                  <a:schemeClr val="accent1">
+                    <a:lumMod val="75000"/>
+                  </a:schemeClr>
+                </a:solidFill>
+              </a:rPr>
+              <a:t>plan</a:t>
+            </a:r>
+            <a:r>
+              <a:rPr lang="fi-FI" dirty="0">
+                <a:solidFill>
+                  <a:schemeClr val="accent1">
+                    <a:lumMod val="75000"/>
+                  </a:schemeClr>
+                </a:solidFill>
+              </a:rPr>
+              <a:t>), </a:t>
+            </a:r>
+            <a:r>
+              <a:rPr lang="fi-FI" b="1" dirty="0">
+                <a:solidFill>
+                  <a:schemeClr val="accent1">
+                    <a:lumMod val="75000"/>
+                  </a:schemeClr>
+                </a:solidFill>
+              </a:rPr>
+              <a:t>git </a:t>
+            </a:r>
+            <a:r>
+              <a:rPr lang="fi-FI" b="1" dirty="0" err="1">
+                <a:solidFill>
+                  <a:schemeClr val="accent1">
+                    <a:lumMod val="75000"/>
+                  </a:schemeClr>
+                </a:solidFill>
+              </a:rPr>
+              <a:t>pull</a:t>
+            </a:r>
+            <a:endParaRPr lang="fi-FI" b="1" dirty="0"/>
+          </a:p>
+        </p:txBody>
+      </p:sp>
+      <p:cxnSp>
+        <p:nvCxnSpPr>
+          <p:cNvPr id="59" name="Straight Arrow Connector 58">
+            <a:extLst>
+              <a:ext uri="{FF2B5EF4-FFF2-40B4-BE49-F238E27FC236}">
+                <a16:creationId xmlns:a16="http://schemas.microsoft.com/office/drawing/2014/main" id="{E1D1A71E-7C15-4238-8F3D-3E77FEE51D24}"/>
+              </a:ext>
+            </a:extLst>
+          </p:cNvPr>
+          <p:cNvCxnSpPr>
+            <a:cxnSpLocks/>
+          </p:cNvCxnSpPr>
+          <p:nvPr/>
+        </p:nvCxnSpPr>
+        <p:spPr>
+          <a:xfrm flipH="1">
+            <a:off x="5561060" y="2199803"/>
+            <a:ext cx="10171" cy="2450751"/>
+          </a:xfrm>
+          <a:prstGeom prst="straightConnector1">
+            <a:avLst/>
+          </a:prstGeom>
+          <a:ln>
+            <a:tailEnd type="arrow"/>
+          </a:ln>
+        </p:spPr>
+        <p:style>
+          <a:lnRef idx="1">
+            <a:schemeClr val="accent1"/>
+          </a:lnRef>
+          <a:fillRef idx="0">
+            <a:schemeClr val="accent1"/>
+          </a:fillRef>
+          <a:effectRef idx="0">
+            <a:schemeClr val="accent1"/>
+          </a:effectRef>
+          <a:fontRef idx="minor">
+            <a:schemeClr val="tx1"/>
+          </a:fontRef>
+        </p:style>
+      </p:cxnSp>
+      <p:sp>
+        <p:nvSpPr>
+          <p:cNvPr id="60" name="Rectangle 59">
+            <a:extLst>
+              <a:ext uri="{FF2B5EF4-FFF2-40B4-BE49-F238E27FC236}">
+                <a16:creationId xmlns:a16="http://schemas.microsoft.com/office/drawing/2014/main" id="{B9CA22A4-B4A3-49F8-9175-922089448B29}"/>
+              </a:ext>
+            </a:extLst>
+          </p:cNvPr>
+          <p:cNvSpPr/>
+          <p:nvPr/>
+        </p:nvSpPr>
+        <p:spPr>
+          <a:xfrm rot="16200000">
+            <a:off x="4204186" y="3128936"/>
+            <a:ext cx="2227597" cy="369332"/>
+          </a:xfrm>
+          <a:prstGeom prst="rect">
+            <a:avLst/>
+          </a:prstGeom>
+        </p:spPr>
+        <p:txBody>
+          <a:bodyPr wrap="none">
+            <a:spAutoFit/>
+          </a:bodyPr>
+          <a:lstStyle/>
+          <a:p>
+            <a:r>
+              <a:rPr lang="fi-FI" dirty="0">
+                <a:solidFill>
+                  <a:schemeClr val="accent1">
+                    <a:lumMod val="75000"/>
+                  </a:schemeClr>
+                </a:solidFill>
+              </a:rPr>
+              <a:t> (</a:t>
+            </a:r>
+            <a:r>
+              <a:rPr lang="fi-FI" dirty="0" err="1">
+                <a:solidFill>
+                  <a:schemeClr val="accent1">
+                    <a:lumMod val="75000"/>
+                  </a:schemeClr>
+                </a:solidFill>
+              </a:rPr>
+              <a:t>after</a:t>
+            </a:r>
+            <a:r>
+              <a:rPr lang="fi-FI" dirty="0">
+                <a:solidFill>
+                  <a:schemeClr val="accent1">
+                    <a:lumMod val="75000"/>
+                  </a:schemeClr>
+                </a:solidFill>
+              </a:rPr>
+              <a:t> </a:t>
+            </a:r>
+            <a:r>
+              <a:rPr lang="fi-FI" dirty="0" err="1">
+                <a:solidFill>
+                  <a:schemeClr val="accent1">
+                    <a:lumMod val="75000"/>
+                  </a:schemeClr>
+                </a:solidFill>
+              </a:rPr>
+              <a:t>merge</a:t>
+            </a:r>
+            <a:r>
+              <a:rPr lang="fi-FI" dirty="0">
+                <a:solidFill>
+                  <a:schemeClr val="accent1">
+                    <a:lumMod val="75000"/>
+                  </a:schemeClr>
+                </a:solidFill>
+              </a:rPr>
+              <a:t>)  </a:t>
+            </a:r>
+            <a:r>
+              <a:rPr lang="fi-FI" b="1" dirty="0">
+                <a:solidFill>
+                  <a:schemeClr val="accent1">
+                    <a:lumMod val="75000"/>
+                  </a:schemeClr>
+                </a:solidFill>
+              </a:rPr>
+              <a:t>git </a:t>
+            </a:r>
+            <a:r>
+              <a:rPr lang="fi-FI" b="1" dirty="0" err="1">
+                <a:solidFill>
+                  <a:schemeClr val="accent1">
+                    <a:lumMod val="75000"/>
+                  </a:schemeClr>
+                </a:solidFill>
+              </a:rPr>
+              <a:t>pull</a:t>
+            </a:r>
+            <a:endParaRPr lang="fi-FI" b="1" dirty="0"/>
+          </a:p>
+        </p:txBody>
+      </p:sp>
+      <p:sp>
+        <p:nvSpPr>
+          <p:cNvPr id="63" name="Rectangle 62">
+            <a:extLst>
+              <a:ext uri="{FF2B5EF4-FFF2-40B4-BE49-F238E27FC236}">
+                <a16:creationId xmlns:a16="http://schemas.microsoft.com/office/drawing/2014/main" id="{34CF41B2-BE4E-4767-8212-9A16E2116B3A}"/>
+              </a:ext>
+            </a:extLst>
+          </p:cNvPr>
+          <p:cNvSpPr/>
+          <p:nvPr/>
+        </p:nvSpPr>
+        <p:spPr>
+          <a:xfrm>
+            <a:off x="8409402" y="1422125"/>
+            <a:ext cx="1714564" cy="552860"/>
+          </a:xfrm>
+          <a:prstGeom prst="rect">
+            <a:avLst/>
+          </a:prstGeom>
+          <a:solidFill>
+            <a:schemeClr val="bg1"/>
+          </a:solidFill>
+          <a:ln>
+            <a:prstDash val="dash"/>
+          </a:ln>
+        </p:spPr>
+        <p:style>
+          <a:lnRef idx="2">
+            <a:schemeClr val="accent1">
+              <a:shade val="50000"/>
+            </a:schemeClr>
+          </a:lnRef>
+          <a:fillRef idx="1">
+            <a:schemeClr val="accent1"/>
+          </a:fillRef>
+          <a:effectRef idx="0">
+            <a:schemeClr val="accent1"/>
+          </a:effectRef>
+          <a:fontRef idx="minor">
+            <a:schemeClr val="lt1"/>
+          </a:fontRef>
+        </p:style>
+        <p:txBody>
+          <a:bodyPr rtlCol="0" anchor="t" anchorCtr="0"/>
+          <a:lstStyle/>
+          <a:p>
+            <a:pPr algn="ctr"/>
+            <a:r>
+              <a:rPr lang="fi-FI" sz="1200" dirty="0" err="1">
+                <a:solidFill>
+                  <a:schemeClr val="accent1">
+                    <a:lumMod val="75000"/>
+                  </a:schemeClr>
+                </a:solidFill>
+              </a:rPr>
+              <a:t>Delete</a:t>
+            </a:r>
+            <a:r>
+              <a:rPr lang="fi-FI" sz="1200" dirty="0">
+                <a:solidFill>
+                  <a:schemeClr val="accent1">
+                    <a:lumMod val="75000"/>
+                  </a:schemeClr>
+                </a:solidFill>
+              </a:rPr>
+              <a:t> remote branch </a:t>
+            </a:r>
+            <a:r>
+              <a:rPr lang="fi-FI" sz="1200" dirty="0" err="1">
+                <a:solidFill>
+                  <a:schemeClr val="accent1">
+                    <a:lumMod val="75000"/>
+                  </a:schemeClr>
+                </a:solidFill>
+              </a:rPr>
+              <a:t>after</a:t>
+            </a:r>
+            <a:r>
+              <a:rPr lang="fi-FI" sz="1200" dirty="0">
+                <a:solidFill>
+                  <a:schemeClr val="accent1">
+                    <a:lumMod val="75000"/>
+                  </a:schemeClr>
+                </a:solidFill>
+              </a:rPr>
+              <a:t> </a:t>
+            </a:r>
+            <a:r>
+              <a:rPr lang="fi-FI" sz="1200" dirty="0" err="1">
+                <a:solidFill>
+                  <a:schemeClr val="accent1">
+                    <a:lumMod val="75000"/>
+                  </a:schemeClr>
+                </a:solidFill>
+              </a:rPr>
+              <a:t>merge</a:t>
+            </a:r>
+            <a:r>
+              <a:rPr lang="fi-FI" sz="1200" dirty="0">
+                <a:solidFill>
+                  <a:schemeClr val="accent1">
+                    <a:lumMod val="75000"/>
+                  </a:schemeClr>
+                </a:solidFill>
+              </a:rPr>
+              <a:t>!</a:t>
+            </a:r>
+          </a:p>
+        </p:txBody>
+      </p:sp>
+      <p:sp>
+        <p:nvSpPr>
+          <p:cNvPr id="64" name="Rectangle 63">
+            <a:extLst>
+              <a:ext uri="{FF2B5EF4-FFF2-40B4-BE49-F238E27FC236}">
+                <a16:creationId xmlns:a16="http://schemas.microsoft.com/office/drawing/2014/main" id="{F4797FF3-4475-45E2-B974-8E317D8EE08C}"/>
+              </a:ext>
+            </a:extLst>
+          </p:cNvPr>
+          <p:cNvSpPr/>
+          <p:nvPr/>
+        </p:nvSpPr>
+        <p:spPr>
+          <a:xfrm>
+            <a:off x="8098732" y="4214151"/>
+            <a:ext cx="2386953" cy="889064"/>
+          </a:xfrm>
+          <a:prstGeom prst="rect">
+            <a:avLst/>
+          </a:prstGeom>
+          <a:solidFill>
+            <a:schemeClr val="bg1"/>
+          </a:solidFill>
+          <a:ln>
+            <a:prstDash val="dash"/>
+          </a:ln>
+        </p:spPr>
+        <p:style>
+          <a:lnRef idx="2">
+            <a:schemeClr val="accent1">
+              <a:shade val="50000"/>
+            </a:schemeClr>
+          </a:lnRef>
+          <a:fillRef idx="1">
+            <a:schemeClr val="accent1"/>
+          </a:fillRef>
+          <a:effectRef idx="0">
+            <a:schemeClr val="accent1"/>
+          </a:effectRef>
+          <a:fontRef idx="minor">
+            <a:schemeClr val="lt1"/>
+          </a:fontRef>
+        </p:style>
+        <p:txBody>
+          <a:bodyPr rtlCol="0" anchor="t" anchorCtr="0"/>
+          <a:lstStyle/>
+          <a:p>
+            <a:pPr algn="ctr"/>
+            <a:r>
+              <a:rPr lang="fi-FI" sz="1200" dirty="0">
+                <a:solidFill>
+                  <a:schemeClr val="accent1">
+                    <a:lumMod val="75000"/>
+                  </a:schemeClr>
+                </a:solidFill>
+              </a:rPr>
+              <a:t>git </a:t>
+            </a:r>
+            <a:r>
+              <a:rPr lang="fi-FI" sz="1200" dirty="0" err="1">
+                <a:solidFill>
+                  <a:schemeClr val="accent1">
+                    <a:lumMod val="75000"/>
+                  </a:schemeClr>
+                </a:solidFill>
+              </a:rPr>
+              <a:t>checkout</a:t>
+            </a:r>
+            <a:r>
+              <a:rPr lang="fi-FI" sz="1200" dirty="0">
+                <a:solidFill>
+                  <a:schemeClr val="accent1">
+                    <a:lumMod val="75000"/>
+                  </a:schemeClr>
+                </a:solidFill>
+              </a:rPr>
+              <a:t> main</a:t>
+            </a:r>
+            <a:br>
+              <a:rPr lang="fi-FI" sz="1200" dirty="0">
+                <a:solidFill>
+                  <a:schemeClr val="accent1">
+                    <a:lumMod val="75000"/>
+                  </a:schemeClr>
+                </a:solidFill>
+              </a:rPr>
+            </a:br>
+            <a:r>
+              <a:rPr lang="fi-FI" sz="1200" dirty="0">
+                <a:solidFill>
+                  <a:schemeClr val="accent1">
+                    <a:lumMod val="75000"/>
+                  </a:schemeClr>
+                </a:solidFill>
+              </a:rPr>
+              <a:t>(git </a:t>
+            </a:r>
+            <a:r>
+              <a:rPr lang="fi-FI" sz="1200" dirty="0" err="1">
+                <a:solidFill>
+                  <a:schemeClr val="accent1">
+                    <a:lumMod val="75000"/>
+                  </a:schemeClr>
+                </a:solidFill>
+              </a:rPr>
+              <a:t>pull</a:t>
+            </a:r>
+            <a:r>
+              <a:rPr lang="fi-FI" sz="1200" dirty="0">
+                <a:solidFill>
+                  <a:schemeClr val="accent1">
+                    <a:lumMod val="75000"/>
+                  </a:schemeClr>
+                </a:solidFill>
+              </a:rPr>
+              <a:t>      </a:t>
+            </a:r>
+            <a:r>
+              <a:rPr lang="fi-FI" sz="1200" dirty="0" err="1">
+                <a:solidFill>
+                  <a:schemeClr val="accent1">
+                    <a:lumMod val="75000"/>
+                  </a:schemeClr>
+                </a:solidFill>
+              </a:rPr>
+              <a:t>remember</a:t>
+            </a:r>
+            <a:r>
+              <a:rPr lang="fi-FI" sz="1200" dirty="0">
+                <a:solidFill>
+                  <a:schemeClr val="accent1">
+                    <a:lumMod val="75000"/>
+                  </a:schemeClr>
+                </a:solidFill>
+              </a:rPr>
+              <a:t>!)</a:t>
+            </a:r>
+            <a:br>
+              <a:rPr lang="fi-FI" sz="1200" dirty="0">
+                <a:solidFill>
+                  <a:schemeClr val="accent1">
+                    <a:lumMod val="75000"/>
+                  </a:schemeClr>
+                </a:solidFill>
+              </a:rPr>
+            </a:br>
+            <a:r>
+              <a:rPr lang="fi-FI" sz="1200" dirty="0" err="1">
+                <a:solidFill>
+                  <a:schemeClr val="accent1">
+                    <a:lumMod val="75000"/>
+                  </a:schemeClr>
+                </a:solidFill>
+              </a:rPr>
+              <a:t>Delete</a:t>
+            </a:r>
+            <a:r>
+              <a:rPr lang="fi-FI" sz="1200" dirty="0">
+                <a:solidFill>
+                  <a:schemeClr val="accent1">
+                    <a:lumMod val="75000"/>
+                  </a:schemeClr>
+                </a:solidFill>
+              </a:rPr>
+              <a:t> </a:t>
+            </a:r>
+            <a:r>
+              <a:rPr lang="fi-FI" sz="1200" dirty="0" err="1">
+                <a:solidFill>
+                  <a:schemeClr val="accent1">
+                    <a:lumMod val="75000"/>
+                  </a:schemeClr>
+                </a:solidFill>
+              </a:rPr>
+              <a:t>local</a:t>
+            </a:r>
+            <a:r>
+              <a:rPr lang="fi-FI" sz="1200" dirty="0">
+                <a:solidFill>
+                  <a:schemeClr val="accent1">
+                    <a:lumMod val="75000"/>
+                  </a:schemeClr>
+                </a:solidFill>
+              </a:rPr>
+              <a:t> branch </a:t>
+            </a:r>
+            <a:r>
+              <a:rPr lang="fi-FI" sz="1200" dirty="0" err="1">
+                <a:solidFill>
+                  <a:schemeClr val="accent1">
+                    <a:lumMod val="75000"/>
+                  </a:schemeClr>
+                </a:solidFill>
+              </a:rPr>
+              <a:t>after</a:t>
+            </a:r>
+            <a:r>
+              <a:rPr lang="fi-FI" sz="1200" dirty="0">
+                <a:solidFill>
+                  <a:schemeClr val="accent1">
+                    <a:lumMod val="75000"/>
+                  </a:schemeClr>
+                </a:solidFill>
+              </a:rPr>
+              <a:t> </a:t>
+            </a:r>
+            <a:r>
+              <a:rPr lang="fi-FI" sz="1200" dirty="0" err="1">
+                <a:solidFill>
+                  <a:schemeClr val="accent1">
+                    <a:lumMod val="75000"/>
+                  </a:schemeClr>
+                </a:solidFill>
+              </a:rPr>
+              <a:t>merge</a:t>
+            </a:r>
+            <a:r>
+              <a:rPr lang="fi-FI" sz="1200" dirty="0">
+                <a:solidFill>
+                  <a:schemeClr val="accent1">
+                    <a:lumMod val="75000"/>
+                  </a:schemeClr>
+                </a:solidFill>
+              </a:rPr>
+              <a:t>!</a:t>
+            </a:r>
+            <a:br>
+              <a:rPr lang="fi-FI" sz="1200" dirty="0">
+                <a:solidFill>
+                  <a:schemeClr val="accent1">
+                    <a:lumMod val="75000"/>
+                  </a:schemeClr>
+                </a:solidFill>
+              </a:rPr>
+            </a:br>
+            <a:r>
+              <a:rPr lang="fi-FI" sz="1200" dirty="0">
+                <a:solidFill>
+                  <a:schemeClr val="accent1">
+                    <a:lumMod val="75000"/>
+                  </a:schemeClr>
+                </a:solidFill>
+              </a:rPr>
+              <a:t>git branch -D </a:t>
+            </a:r>
+            <a:r>
+              <a:rPr lang="fi-FI" sz="1200" dirty="0" err="1">
+                <a:solidFill>
+                  <a:schemeClr val="accent1">
+                    <a:lumMod val="75000"/>
+                  </a:schemeClr>
+                </a:solidFill>
+              </a:rPr>
+              <a:t>product-listAll-add</a:t>
+            </a:r>
+            <a:r>
+              <a:rPr lang="fi-FI" sz="1200" dirty="0">
+                <a:solidFill>
+                  <a:schemeClr val="accent1">
+                    <a:lumMod val="75000"/>
+                  </a:schemeClr>
+                </a:solidFill>
+              </a:rPr>
+              <a:t>-…</a:t>
+            </a:r>
+          </a:p>
+        </p:txBody>
+      </p:sp>
+      <p:sp>
+        <p:nvSpPr>
+          <p:cNvPr id="29" name="Oval 28">
+            <a:extLst>
+              <a:ext uri="{FF2B5EF4-FFF2-40B4-BE49-F238E27FC236}">
+                <a16:creationId xmlns:a16="http://schemas.microsoft.com/office/drawing/2014/main" id="{566B4106-0AC9-4508-928F-60B9AB67165D}"/>
+              </a:ext>
+            </a:extLst>
+          </p:cNvPr>
+          <p:cNvSpPr/>
+          <p:nvPr/>
+        </p:nvSpPr>
+        <p:spPr>
+          <a:xfrm>
+            <a:off x="2852291" y="4797789"/>
+            <a:ext cx="160205" cy="148551"/>
+          </a:xfrm>
+          <a:prstGeom prst="ellipse">
+            <a:avLst/>
+          </a:prstGeom>
+          <a:noFill/>
+          <a:ln>
+            <a:noFill/>
+          </a:ln>
+        </p:spPr>
+        <p:style>
+          <a:lnRef idx="2">
+            <a:schemeClr val="accent1">
+              <a:shade val="50000"/>
+            </a:schemeClr>
+          </a:lnRef>
+          <a:fillRef idx="1">
+            <a:schemeClr val="accent1"/>
+          </a:fillRef>
+          <a:effectRef idx="0">
+            <a:schemeClr val="accent1"/>
+          </a:effectRef>
+          <a:fontRef idx="minor">
+            <a:schemeClr val="lt1"/>
+          </a:fontRef>
+        </p:style>
+        <p:txBody>
+          <a:bodyPr rtlCol="0" anchor="ctr"/>
+          <a:lstStyle/>
+          <a:p>
+            <a:pPr algn="ctr"/>
+            <a:r>
+              <a:rPr lang="en-US" sz="1200" dirty="0">
+                <a:solidFill>
+                  <a:srgbClr val="C00000"/>
+                </a:solidFill>
+              </a:rPr>
+              <a:t>1</a:t>
+            </a:r>
+          </a:p>
+        </p:txBody>
+      </p:sp>
+      <p:sp>
+        <p:nvSpPr>
+          <p:cNvPr id="34" name="Oval 33">
+            <a:extLst>
+              <a:ext uri="{FF2B5EF4-FFF2-40B4-BE49-F238E27FC236}">
+                <a16:creationId xmlns:a16="http://schemas.microsoft.com/office/drawing/2014/main" id="{BE1C1347-15BE-424E-BEA4-D7DE15ECD131}"/>
+              </a:ext>
+            </a:extLst>
+          </p:cNvPr>
+          <p:cNvSpPr/>
+          <p:nvPr/>
+        </p:nvSpPr>
+        <p:spPr>
+          <a:xfrm>
+            <a:off x="2753785" y="2963254"/>
+            <a:ext cx="160205" cy="148551"/>
+          </a:xfrm>
+          <a:prstGeom prst="ellipse">
+            <a:avLst/>
+          </a:prstGeom>
+          <a:noFill/>
+          <a:ln>
+            <a:noFill/>
+          </a:ln>
+        </p:spPr>
+        <p:style>
+          <a:lnRef idx="2">
+            <a:schemeClr val="accent1">
+              <a:shade val="50000"/>
+            </a:schemeClr>
+          </a:lnRef>
+          <a:fillRef idx="1">
+            <a:schemeClr val="accent1"/>
+          </a:fillRef>
+          <a:effectRef idx="0">
+            <a:schemeClr val="accent1"/>
+          </a:effectRef>
+          <a:fontRef idx="minor">
+            <a:schemeClr val="lt1"/>
+          </a:fontRef>
+        </p:style>
+        <p:txBody>
+          <a:bodyPr rtlCol="0" anchor="ctr"/>
+          <a:lstStyle/>
+          <a:p>
+            <a:pPr algn="ctr"/>
+            <a:r>
+              <a:rPr lang="en-US" sz="1200" dirty="0">
+                <a:solidFill>
+                  <a:srgbClr val="C00000"/>
+                </a:solidFill>
+              </a:rPr>
+              <a:t>2</a:t>
+            </a:r>
+          </a:p>
+        </p:txBody>
+      </p:sp>
+      <p:sp>
+        <p:nvSpPr>
+          <p:cNvPr id="35" name="Oval 34">
+            <a:extLst>
+              <a:ext uri="{FF2B5EF4-FFF2-40B4-BE49-F238E27FC236}">
+                <a16:creationId xmlns:a16="http://schemas.microsoft.com/office/drawing/2014/main" id="{06B1C04E-AF95-4F0B-9A88-31628E0EDB94}"/>
+              </a:ext>
+            </a:extLst>
+          </p:cNvPr>
+          <p:cNvSpPr/>
+          <p:nvPr/>
+        </p:nvSpPr>
+        <p:spPr>
+          <a:xfrm>
+            <a:off x="2753784" y="1513201"/>
+            <a:ext cx="160205" cy="148551"/>
+          </a:xfrm>
+          <a:prstGeom prst="ellipse">
+            <a:avLst/>
+          </a:prstGeom>
+          <a:noFill/>
+          <a:ln>
+            <a:noFill/>
+          </a:ln>
+        </p:spPr>
+        <p:style>
+          <a:lnRef idx="2">
+            <a:schemeClr val="accent1">
+              <a:shade val="50000"/>
+            </a:schemeClr>
+          </a:lnRef>
+          <a:fillRef idx="1">
+            <a:schemeClr val="accent1"/>
+          </a:fillRef>
+          <a:effectRef idx="0">
+            <a:schemeClr val="accent1"/>
+          </a:effectRef>
+          <a:fontRef idx="minor">
+            <a:schemeClr val="lt1"/>
+          </a:fontRef>
+        </p:style>
+        <p:txBody>
+          <a:bodyPr rtlCol="0" anchor="ctr"/>
+          <a:lstStyle/>
+          <a:p>
+            <a:pPr algn="ctr"/>
+            <a:r>
+              <a:rPr lang="en-US" sz="1200" dirty="0">
+                <a:solidFill>
+                  <a:srgbClr val="C00000"/>
+                </a:solidFill>
+              </a:rPr>
+              <a:t>3</a:t>
+            </a:r>
+          </a:p>
+        </p:txBody>
+      </p:sp>
+      <p:sp>
+        <p:nvSpPr>
+          <p:cNvPr id="37" name="Oval 36">
+            <a:extLst>
+              <a:ext uri="{FF2B5EF4-FFF2-40B4-BE49-F238E27FC236}">
+                <a16:creationId xmlns:a16="http://schemas.microsoft.com/office/drawing/2014/main" id="{A4B51C5C-73F4-41D5-9BE0-B58532FE9C1A}"/>
+              </a:ext>
+            </a:extLst>
+          </p:cNvPr>
+          <p:cNvSpPr/>
+          <p:nvPr/>
+        </p:nvSpPr>
+        <p:spPr>
+          <a:xfrm>
+            <a:off x="5860046" y="5835292"/>
+            <a:ext cx="160205" cy="148551"/>
+          </a:xfrm>
+          <a:prstGeom prst="ellipse">
+            <a:avLst/>
+          </a:prstGeom>
+          <a:noFill/>
+          <a:ln>
+            <a:noFill/>
+          </a:ln>
+        </p:spPr>
+        <p:style>
+          <a:lnRef idx="2">
+            <a:schemeClr val="accent1">
+              <a:shade val="50000"/>
+            </a:schemeClr>
+          </a:lnRef>
+          <a:fillRef idx="1">
+            <a:schemeClr val="accent1"/>
+          </a:fillRef>
+          <a:effectRef idx="0">
+            <a:schemeClr val="accent1"/>
+          </a:effectRef>
+          <a:fontRef idx="minor">
+            <a:schemeClr val="lt1"/>
+          </a:fontRef>
+        </p:style>
+        <p:txBody>
+          <a:bodyPr rtlCol="0" anchor="ctr"/>
+          <a:lstStyle/>
+          <a:p>
+            <a:pPr algn="ctr"/>
+            <a:r>
+              <a:rPr lang="en-US" sz="1200" dirty="0">
+                <a:solidFill>
+                  <a:srgbClr val="C00000"/>
+                </a:solidFill>
+              </a:rPr>
+              <a:t>4</a:t>
+            </a:r>
+          </a:p>
+        </p:txBody>
+      </p:sp>
+      <p:sp>
+        <p:nvSpPr>
+          <p:cNvPr id="38" name="Oval 37">
+            <a:extLst>
+              <a:ext uri="{FF2B5EF4-FFF2-40B4-BE49-F238E27FC236}">
+                <a16:creationId xmlns:a16="http://schemas.microsoft.com/office/drawing/2014/main" id="{C00EBFF0-F65E-42B7-A199-D470A364C21E}"/>
+              </a:ext>
+            </a:extLst>
+          </p:cNvPr>
+          <p:cNvSpPr/>
+          <p:nvPr/>
+        </p:nvSpPr>
+        <p:spPr>
+          <a:xfrm>
+            <a:off x="7443827" y="5037286"/>
+            <a:ext cx="160205" cy="148551"/>
+          </a:xfrm>
+          <a:prstGeom prst="ellipse">
+            <a:avLst/>
+          </a:prstGeom>
+          <a:noFill/>
+          <a:ln>
+            <a:noFill/>
+          </a:ln>
+        </p:spPr>
+        <p:style>
+          <a:lnRef idx="2">
+            <a:schemeClr val="accent1">
+              <a:shade val="50000"/>
+            </a:schemeClr>
+          </a:lnRef>
+          <a:fillRef idx="1">
+            <a:schemeClr val="accent1"/>
+          </a:fillRef>
+          <a:effectRef idx="0">
+            <a:schemeClr val="accent1"/>
+          </a:effectRef>
+          <a:fontRef idx="minor">
+            <a:schemeClr val="lt1"/>
+          </a:fontRef>
+        </p:style>
+        <p:txBody>
+          <a:bodyPr rtlCol="0" anchor="ctr"/>
+          <a:lstStyle/>
+          <a:p>
+            <a:pPr algn="ctr"/>
+            <a:r>
+              <a:rPr lang="en-US" sz="1200" dirty="0">
+                <a:solidFill>
+                  <a:srgbClr val="C00000"/>
+                </a:solidFill>
+              </a:rPr>
+              <a:t>5</a:t>
+            </a:r>
+          </a:p>
+        </p:txBody>
+      </p:sp>
+      <p:sp>
+        <p:nvSpPr>
+          <p:cNvPr id="2" name="Rectangle 1">
+            <a:extLst>
+              <a:ext uri="{FF2B5EF4-FFF2-40B4-BE49-F238E27FC236}">
+                <a16:creationId xmlns:a16="http://schemas.microsoft.com/office/drawing/2014/main" id="{236C519C-9FC2-48EB-BE49-FCC69C2C6AFD}"/>
+              </a:ext>
+            </a:extLst>
+          </p:cNvPr>
+          <p:cNvSpPr/>
+          <p:nvPr/>
+        </p:nvSpPr>
+        <p:spPr>
+          <a:xfrm>
+            <a:off x="7753819" y="5369947"/>
+            <a:ext cx="1781450" cy="369332"/>
+          </a:xfrm>
+          <a:prstGeom prst="rect">
+            <a:avLst/>
+          </a:prstGeom>
+        </p:spPr>
+        <p:txBody>
+          <a:bodyPr wrap="none">
+            <a:spAutoFit/>
+          </a:bodyPr>
+          <a:lstStyle/>
+          <a:p>
+            <a:r>
+              <a:rPr lang="fi-FI" dirty="0" err="1">
+                <a:solidFill>
+                  <a:schemeClr val="accent1">
+                    <a:lumMod val="75000"/>
+                  </a:schemeClr>
+                </a:solidFill>
+              </a:rPr>
+              <a:t>do</a:t>
+            </a:r>
+            <a:r>
+              <a:rPr lang="fi-FI" dirty="0">
+                <a:solidFill>
+                  <a:schemeClr val="accent1">
+                    <a:lumMod val="75000"/>
+                  </a:schemeClr>
+                </a:solidFill>
+              </a:rPr>
+              <a:t> </a:t>
+            </a:r>
+            <a:r>
+              <a:rPr lang="fi-FI" dirty="0" err="1">
+                <a:solidFill>
+                  <a:schemeClr val="accent1">
+                    <a:lumMod val="75000"/>
+                  </a:schemeClr>
+                </a:solidFill>
+              </a:rPr>
+              <a:t>your</a:t>
+            </a:r>
+            <a:r>
+              <a:rPr lang="fi-FI" dirty="0">
+                <a:solidFill>
+                  <a:schemeClr val="accent1">
+                    <a:lumMod val="75000"/>
+                  </a:schemeClr>
+                </a:solidFill>
+              </a:rPr>
+              <a:t> </a:t>
+            </a:r>
+            <a:r>
+              <a:rPr lang="fi-FI" dirty="0" err="1">
+                <a:solidFill>
+                  <a:schemeClr val="accent1">
+                    <a:lumMod val="75000"/>
+                  </a:schemeClr>
+                </a:solidFill>
+              </a:rPr>
+              <a:t>changes</a:t>
+            </a:r>
+            <a:r>
+              <a:rPr lang="fi-FI" dirty="0">
+                <a:solidFill>
+                  <a:schemeClr val="accent1">
+                    <a:lumMod val="75000"/>
+                  </a:schemeClr>
+                </a:solidFill>
+              </a:rPr>
+              <a:t>,</a:t>
+            </a:r>
+            <a:endParaRPr lang="en-US" dirty="0"/>
+          </a:p>
+        </p:txBody>
+      </p:sp>
+      <p:sp>
+        <p:nvSpPr>
+          <p:cNvPr id="39" name="Oval 38">
+            <a:extLst>
+              <a:ext uri="{FF2B5EF4-FFF2-40B4-BE49-F238E27FC236}">
+                <a16:creationId xmlns:a16="http://schemas.microsoft.com/office/drawing/2014/main" id="{579F89D3-1941-41A9-9CC2-9C28A4D78481}"/>
+              </a:ext>
+            </a:extLst>
+          </p:cNvPr>
+          <p:cNvSpPr/>
+          <p:nvPr/>
+        </p:nvSpPr>
+        <p:spPr>
+          <a:xfrm>
+            <a:off x="8450295" y="5314587"/>
+            <a:ext cx="160205" cy="148551"/>
+          </a:xfrm>
+          <a:prstGeom prst="ellipse">
+            <a:avLst/>
+          </a:prstGeom>
+          <a:noFill/>
+          <a:ln>
+            <a:noFill/>
+          </a:ln>
+        </p:spPr>
+        <p:style>
+          <a:lnRef idx="2">
+            <a:schemeClr val="accent1">
+              <a:shade val="50000"/>
+            </a:schemeClr>
+          </a:lnRef>
+          <a:fillRef idx="1">
+            <a:schemeClr val="accent1"/>
+          </a:fillRef>
+          <a:effectRef idx="0">
+            <a:schemeClr val="accent1"/>
+          </a:effectRef>
+          <a:fontRef idx="minor">
+            <a:schemeClr val="lt1"/>
+          </a:fontRef>
+        </p:style>
+        <p:txBody>
+          <a:bodyPr rtlCol="0" anchor="ctr"/>
+          <a:lstStyle/>
+          <a:p>
+            <a:pPr algn="ctr"/>
+            <a:r>
+              <a:rPr lang="en-US" sz="1200" dirty="0">
+                <a:solidFill>
+                  <a:srgbClr val="C00000"/>
+                </a:solidFill>
+              </a:rPr>
+              <a:t>6</a:t>
+            </a:r>
+          </a:p>
+        </p:txBody>
+      </p:sp>
+      <p:sp>
+        <p:nvSpPr>
+          <p:cNvPr id="40" name="Oval 39">
+            <a:extLst>
+              <a:ext uri="{FF2B5EF4-FFF2-40B4-BE49-F238E27FC236}">
+                <a16:creationId xmlns:a16="http://schemas.microsoft.com/office/drawing/2014/main" id="{7DF54D2D-E36F-4C01-917E-12A3C8E30F8F}"/>
+              </a:ext>
+            </a:extLst>
+          </p:cNvPr>
+          <p:cNvSpPr/>
+          <p:nvPr/>
+        </p:nvSpPr>
+        <p:spPr>
+          <a:xfrm>
+            <a:off x="9796374" y="5295986"/>
+            <a:ext cx="160205" cy="148551"/>
+          </a:xfrm>
+          <a:prstGeom prst="ellipse">
+            <a:avLst/>
+          </a:prstGeom>
+          <a:noFill/>
+          <a:ln>
+            <a:noFill/>
+          </a:ln>
+        </p:spPr>
+        <p:style>
+          <a:lnRef idx="2">
+            <a:schemeClr val="accent1">
+              <a:shade val="50000"/>
+            </a:schemeClr>
+          </a:lnRef>
+          <a:fillRef idx="1">
+            <a:schemeClr val="accent1"/>
+          </a:fillRef>
+          <a:effectRef idx="0">
+            <a:schemeClr val="accent1"/>
+          </a:effectRef>
+          <a:fontRef idx="minor">
+            <a:schemeClr val="lt1"/>
+          </a:fontRef>
+        </p:style>
+        <p:txBody>
+          <a:bodyPr rtlCol="0" anchor="ctr"/>
+          <a:lstStyle/>
+          <a:p>
+            <a:pPr algn="ctr"/>
+            <a:r>
+              <a:rPr lang="en-US" sz="1200" dirty="0">
+                <a:solidFill>
+                  <a:srgbClr val="C00000"/>
+                </a:solidFill>
+              </a:rPr>
+              <a:t>7</a:t>
+            </a:r>
+          </a:p>
+        </p:txBody>
+      </p:sp>
+      <p:sp>
+        <p:nvSpPr>
+          <p:cNvPr id="42" name="Oval 41">
+            <a:extLst>
+              <a:ext uri="{FF2B5EF4-FFF2-40B4-BE49-F238E27FC236}">
+                <a16:creationId xmlns:a16="http://schemas.microsoft.com/office/drawing/2014/main" id="{F5849717-E00E-4590-B978-BBC8ABD19B76}"/>
+              </a:ext>
+            </a:extLst>
+          </p:cNvPr>
+          <p:cNvSpPr/>
+          <p:nvPr/>
+        </p:nvSpPr>
+        <p:spPr>
+          <a:xfrm>
+            <a:off x="10834185" y="5281352"/>
+            <a:ext cx="160205" cy="148551"/>
+          </a:xfrm>
+          <a:prstGeom prst="ellipse">
+            <a:avLst/>
+          </a:prstGeom>
+          <a:noFill/>
+          <a:ln>
+            <a:noFill/>
+          </a:ln>
+        </p:spPr>
+        <p:style>
+          <a:lnRef idx="2">
+            <a:schemeClr val="accent1">
+              <a:shade val="50000"/>
+            </a:schemeClr>
+          </a:lnRef>
+          <a:fillRef idx="1">
+            <a:schemeClr val="accent1"/>
+          </a:fillRef>
+          <a:effectRef idx="0">
+            <a:schemeClr val="accent1"/>
+          </a:effectRef>
+          <a:fontRef idx="minor">
+            <a:schemeClr val="lt1"/>
+          </a:fontRef>
+        </p:style>
+        <p:txBody>
+          <a:bodyPr rtlCol="0" anchor="ctr"/>
+          <a:lstStyle/>
+          <a:p>
+            <a:pPr algn="ctr"/>
+            <a:r>
+              <a:rPr lang="en-US" sz="1200" dirty="0">
+                <a:solidFill>
+                  <a:srgbClr val="C00000"/>
+                </a:solidFill>
+              </a:rPr>
+              <a:t>8</a:t>
+            </a:r>
+          </a:p>
+        </p:txBody>
+      </p:sp>
+      <p:sp>
+        <p:nvSpPr>
+          <p:cNvPr id="43" name="Oval 42">
+            <a:extLst>
+              <a:ext uri="{FF2B5EF4-FFF2-40B4-BE49-F238E27FC236}">
+                <a16:creationId xmlns:a16="http://schemas.microsoft.com/office/drawing/2014/main" id="{642604B8-24F9-4D66-9F77-CB1D004B9FB3}"/>
+              </a:ext>
+            </a:extLst>
+          </p:cNvPr>
+          <p:cNvSpPr/>
+          <p:nvPr/>
+        </p:nvSpPr>
+        <p:spPr>
+          <a:xfrm>
+            <a:off x="11275576" y="4396452"/>
+            <a:ext cx="160205" cy="148551"/>
+          </a:xfrm>
+          <a:prstGeom prst="ellipse">
+            <a:avLst/>
+          </a:prstGeom>
+          <a:noFill/>
+          <a:ln>
+            <a:noFill/>
+          </a:ln>
+        </p:spPr>
+        <p:style>
+          <a:lnRef idx="2">
+            <a:schemeClr val="accent1">
+              <a:shade val="50000"/>
+            </a:schemeClr>
+          </a:lnRef>
+          <a:fillRef idx="1">
+            <a:schemeClr val="accent1"/>
+          </a:fillRef>
+          <a:effectRef idx="0">
+            <a:schemeClr val="accent1"/>
+          </a:effectRef>
+          <a:fontRef idx="minor">
+            <a:schemeClr val="lt1"/>
+          </a:fontRef>
+        </p:style>
+        <p:txBody>
+          <a:bodyPr rtlCol="0" anchor="ctr"/>
+          <a:lstStyle/>
+          <a:p>
+            <a:pPr algn="ctr"/>
+            <a:r>
+              <a:rPr lang="en-US" sz="1200" dirty="0">
+                <a:solidFill>
+                  <a:srgbClr val="C00000"/>
+                </a:solidFill>
+              </a:rPr>
+              <a:t>9</a:t>
+            </a:r>
+          </a:p>
+        </p:txBody>
+      </p:sp>
+      <p:sp>
+        <p:nvSpPr>
+          <p:cNvPr id="44" name="Oval 43">
+            <a:extLst>
+              <a:ext uri="{FF2B5EF4-FFF2-40B4-BE49-F238E27FC236}">
+                <a16:creationId xmlns:a16="http://schemas.microsoft.com/office/drawing/2014/main" id="{789BD750-826A-430E-A079-88E8169B4E6A}"/>
+              </a:ext>
+            </a:extLst>
+          </p:cNvPr>
+          <p:cNvSpPr/>
+          <p:nvPr/>
+        </p:nvSpPr>
+        <p:spPr>
+          <a:xfrm>
+            <a:off x="10906490" y="995058"/>
+            <a:ext cx="523741" cy="247088"/>
+          </a:xfrm>
+          <a:prstGeom prst="ellipse">
+            <a:avLst/>
+          </a:prstGeom>
+          <a:noFill/>
+          <a:ln>
+            <a:noFill/>
+          </a:ln>
+        </p:spPr>
+        <p:style>
+          <a:lnRef idx="2">
+            <a:schemeClr val="accent1">
+              <a:shade val="50000"/>
+            </a:schemeClr>
+          </a:lnRef>
+          <a:fillRef idx="1">
+            <a:schemeClr val="accent1"/>
+          </a:fillRef>
+          <a:effectRef idx="0">
+            <a:schemeClr val="accent1"/>
+          </a:effectRef>
+          <a:fontRef idx="minor">
+            <a:schemeClr val="lt1"/>
+          </a:fontRef>
+        </p:style>
+        <p:txBody>
+          <a:bodyPr rtlCol="0" anchor="ctr"/>
+          <a:lstStyle/>
+          <a:p>
+            <a:pPr algn="ctr"/>
+            <a:r>
+              <a:rPr lang="en-US" sz="1200" dirty="0">
+                <a:solidFill>
+                  <a:srgbClr val="C00000"/>
+                </a:solidFill>
+              </a:rPr>
+              <a:t>10</a:t>
+            </a:r>
+          </a:p>
+        </p:txBody>
+      </p:sp>
+      <p:sp>
+        <p:nvSpPr>
+          <p:cNvPr id="46" name="Oval 45">
+            <a:extLst>
+              <a:ext uri="{FF2B5EF4-FFF2-40B4-BE49-F238E27FC236}">
+                <a16:creationId xmlns:a16="http://schemas.microsoft.com/office/drawing/2014/main" id="{FD873E08-9694-4839-894A-3E27073B954D}"/>
+              </a:ext>
+            </a:extLst>
+          </p:cNvPr>
+          <p:cNvSpPr/>
+          <p:nvPr/>
+        </p:nvSpPr>
+        <p:spPr>
+          <a:xfrm>
+            <a:off x="7076403" y="733842"/>
+            <a:ext cx="523741" cy="247088"/>
+          </a:xfrm>
+          <a:prstGeom prst="ellipse">
+            <a:avLst/>
+          </a:prstGeom>
+          <a:noFill/>
+          <a:ln>
+            <a:noFill/>
+          </a:ln>
+        </p:spPr>
+        <p:style>
+          <a:lnRef idx="2">
+            <a:schemeClr val="accent1">
+              <a:shade val="50000"/>
+            </a:schemeClr>
+          </a:lnRef>
+          <a:fillRef idx="1">
+            <a:schemeClr val="accent1"/>
+          </a:fillRef>
+          <a:effectRef idx="0">
+            <a:schemeClr val="accent1"/>
+          </a:effectRef>
+          <a:fontRef idx="minor">
+            <a:schemeClr val="lt1"/>
+          </a:fontRef>
+        </p:style>
+        <p:txBody>
+          <a:bodyPr rtlCol="0" anchor="ctr"/>
+          <a:lstStyle/>
+          <a:p>
+            <a:pPr algn="ctr"/>
+            <a:r>
+              <a:rPr lang="en-US" sz="1200" dirty="0">
+                <a:solidFill>
+                  <a:srgbClr val="C00000"/>
+                </a:solidFill>
+              </a:rPr>
+              <a:t>11</a:t>
+            </a:r>
+          </a:p>
+        </p:txBody>
+      </p:sp>
+      <p:sp>
+        <p:nvSpPr>
+          <p:cNvPr id="48" name="Oval 47">
+            <a:extLst>
+              <a:ext uri="{FF2B5EF4-FFF2-40B4-BE49-F238E27FC236}">
+                <a16:creationId xmlns:a16="http://schemas.microsoft.com/office/drawing/2014/main" id="{EAF43DFF-A6FD-4477-98DB-41361C03A4A5}"/>
+              </a:ext>
+            </a:extLst>
+          </p:cNvPr>
+          <p:cNvSpPr/>
+          <p:nvPr/>
+        </p:nvSpPr>
+        <p:spPr>
+          <a:xfrm>
+            <a:off x="6241370" y="1108880"/>
+            <a:ext cx="523741" cy="247088"/>
+          </a:xfrm>
+          <a:prstGeom prst="ellipse">
+            <a:avLst/>
+          </a:prstGeom>
+          <a:noFill/>
+          <a:ln>
+            <a:noFill/>
+          </a:ln>
+        </p:spPr>
+        <p:style>
+          <a:lnRef idx="2">
+            <a:schemeClr val="accent1">
+              <a:shade val="50000"/>
+            </a:schemeClr>
+          </a:lnRef>
+          <a:fillRef idx="1">
+            <a:schemeClr val="accent1"/>
+          </a:fillRef>
+          <a:effectRef idx="0">
+            <a:schemeClr val="accent1"/>
+          </a:effectRef>
+          <a:fontRef idx="minor">
+            <a:schemeClr val="lt1"/>
+          </a:fontRef>
+        </p:style>
+        <p:txBody>
+          <a:bodyPr rtlCol="0" anchor="ctr"/>
+          <a:lstStyle/>
+          <a:p>
+            <a:pPr algn="ctr"/>
+            <a:r>
+              <a:rPr lang="en-US" sz="1200" dirty="0">
+                <a:solidFill>
+                  <a:srgbClr val="C00000"/>
+                </a:solidFill>
+              </a:rPr>
+              <a:t>12</a:t>
+            </a:r>
+          </a:p>
+        </p:txBody>
+      </p:sp>
+      <p:sp>
+        <p:nvSpPr>
+          <p:cNvPr id="49" name="Oval 48">
+            <a:extLst>
+              <a:ext uri="{FF2B5EF4-FFF2-40B4-BE49-F238E27FC236}">
+                <a16:creationId xmlns:a16="http://schemas.microsoft.com/office/drawing/2014/main" id="{EDF76B27-9192-4180-A460-5547A4BE843A}"/>
+              </a:ext>
+            </a:extLst>
+          </p:cNvPr>
+          <p:cNvSpPr/>
+          <p:nvPr/>
+        </p:nvSpPr>
+        <p:spPr>
+          <a:xfrm>
+            <a:off x="4153871" y="1094844"/>
+            <a:ext cx="523741" cy="247088"/>
+          </a:xfrm>
+          <a:prstGeom prst="ellipse">
+            <a:avLst/>
+          </a:prstGeom>
+          <a:noFill/>
+          <a:ln>
+            <a:noFill/>
+          </a:ln>
+        </p:spPr>
+        <p:style>
+          <a:lnRef idx="2">
+            <a:schemeClr val="accent1">
+              <a:shade val="50000"/>
+            </a:schemeClr>
+          </a:lnRef>
+          <a:fillRef idx="1">
+            <a:schemeClr val="accent1"/>
+          </a:fillRef>
+          <a:effectRef idx="0">
+            <a:schemeClr val="accent1"/>
+          </a:effectRef>
+          <a:fontRef idx="minor">
+            <a:schemeClr val="lt1"/>
+          </a:fontRef>
+        </p:style>
+        <p:txBody>
+          <a:bodyPr rtlCol="0" anchor="ctr"/>
+          <a:lstStyle/>
+          <a:p>
+            <a:pPr algn="ctr"/>
+            <a:r>
+              <a:rPr lang="en-US" sz="1200" dirty="0">
+                <a:solidFill>
+                  <a:srgbClr val="C00000"/>
+                </a:solidFill>
+              </a:rPr>
+              <a:t>13</a:t>
+            </a:r>
+          </a:p>
+        </p:txBody>
+      </p:sp>
+      <p:sp>
+        <p:nvSpPr>
+          <p:cNvPr id="52" name="Oval 51">
+            <a:extLst>
+              <a:ext uri="{FF2B5EF4-FFF2-40B4-BE49-F238E27FC236}">
+                <a16:creationId xmlns:a16="http://schemas.microsoft.com/office/drawing/2014/main" id="{96E3B299-55EF-4F12-9AB8-B26270C0D2BB}"/>
+              </a:ext>
+            </a:extLst>
+          </p:cNvPr>
+          <p:cNvSpPr/>
+          <p:nvPr/>
+        </p:nvSpPr>
+        <p:spPr>
+          <a:xfrm>
+            <a:off x="9004813" y="2040237"/>
+            <a:ext cx="523741" cy="247088"/>
+          </a:xfrm>
+          <a:prstGeom prst="ellipse">
+            <a:avLst/>
+          </a:prstGeom>
+          <a:noFill/>
+          <a:ln>
+            <a:noFill/>
+          </a:ln>
+        </p:spPr>
+        <p:style>
+          <a:lnRef idx="2">
+            <a:schemeClr val="accent1">
+              <a:shade val="50000"/>
+            </a:schemeClr>
+          </a:lnRef>
+          <a:fillRef idx="1">
+            <a:schemeClr val="accent1"/>
+          </a:fillRef>
+          <a:effectRef idx="0">
+            <a:schemeClr val="accent1"/>
+          </a:effectRef>
+          <a:fontRef idx="minor">
+            <a:schemeClr val="lt1"/>
+          </a:fontRef>
+        </p:style>
+        <p:txBody>
+          <a:bodyPr rtlCol="0" anchor="ctr"/>
+          <a:lstStyle/>
+          <a:p>
+            <a:pPr algn="ctr"/>
+            <a:r>
+              <a:rPr lang="en-US" sz="1200" dirty="0">
+                <a:solidFill>
+                  <a:srgbClr val="C00000"/>
+                </a:solidFill>
+              </a:rPr>
+              <a:t>14</a:t>
+            </a:r>
+          </a:p>
+        </p:txBody>
+      </p:sp>
+      <p:sp>
+        <p:nvSpPr>
+          <p:cNvPr id="54" name="Oval 53">
+            <a:extLst>
+              <a:ext uri="{FF2B5EF4-FFF2-40B4-BE49-F238E27FC236}">
+                <a16:creationId xmlns:a16="http://schemas.microsoft.com/office/drawing/2014/main" id="{1157457C-B857-4282-AA19-E974B476C7D1}"/>
+              </a:ext>
+            </a:extLst>
+          </p:cNvPr>
+          <p:cNvSpPr/>
+          <p:nvPr/>
+        </p:nvSpPr>
+        <p:spPr>
+          <a:xfrm>
+            <a:off x="7873695" y="4297915"/>
+            <a:ext cx="523741" cy="247088"/>
+          </a:xfrm>
+          <a:prstGeom prst="ellipse">
+            <a:avLst/>
+          </a:prstGeom>
+          <a:noFill/>
+          <a:ln>
+            <a:noFill/>
+          </a:ln>
+        </p:spPr>
+        <p:style>
+          <a:lnRef idx="2">
+            <a:schemeClr val="accent1">
+              <a:shade val="50000"/>
+            </a:schemeClr>
+          </a:lnRef>
+          <a:fillRef idx="1">
+            <a:schemeClr val="accent1"/>
+          </a:fillRef>
+          <a:effectRef idx="0">
+            <a:schemeClr val="accent1"/>
+          </a:effectRef>
+          <a:fontRef idx="minor">
+            <a:schemeClr val="lt1"/>
+          </a:fontRef>
+        </p:style>
+        <p:txBody>
+          <a:bodyPr rtlCol="0" anchor="ctr"/>
+          <a:lstStyle/>
+          <a:p>
+            <a:pPr algn="ctr"/>
+            <a:r>
+              <a:rPr lang="en-US" sz="1200">
+                <a:solidFill>
+                  <a:srgbClr val="C00000"/>
+                </a:solidFill>
+              </a:rPr>
+              <a:t>15</a:t>
+            </a:r>
+            <a:endParaRPr lang="en-US" sz="1200" dirty="0">
+              <a:solidFill>
+                <a:srgbClr val="C00000"/>
+              </a:solidFill>
+            </a:endParaRPr>
+          </a:p>
+        </p:txBody>
+      </p:sp>
+      <p:sp>
+        <p:nvSpPr>
+          <p:cNvPr id="55" name="Oval 54">
+            <a:extLst>
+              <a:ext uri="{FF2B5EF4-FFF2-40B4-BE49-F238E27FC236}">
+                <a16:creationId xmlns:a16="http://schemas.microsoft.com/office/drawing/2014/main" id="{79A9D817-DEEF-4933-9183-7F7747AAB51D}"/>
+              </a:ext>
+            </a:extLst>
+          </p:cNvPr>
+          <p:cNvSpPr/>
+          <p:nvPr/>
+        </p:nvSpPr>
+        <p:spPr>
+          <a:xfrm>
+            <a:off x="7662797" y="4783656"/>
+            <a:ext cx="523741" cy="247088"/>
+          </a:xfrm>
+          <a:prstGeom prst="ellipse">
+            <a:avLst/>
+          </a:prstGeom>
+          <a:noFill/>
+          <a:ln>
+            <a:noFill/>
+          </a:ln>
+        </p:spPr>
+        <p:style>
+          <a:lnRef idx="2">
+            <a:schemeClr val="accent1">
+              <a:shade val="50000"/>
+            </a:schemeClr>
+          </a:lnRef>
+          <a:fillRef idx="1">
+            <a:schemeClr val="accent1"/>
+          </a:fillRef>
+          <a:effectRef idx="0">
+            <a:schemeClr val="accent1"/>
+          </a:effectRef>
+          <a:fontRef idx="minor">
+            <a:schemeClr val="lt1"/>
+          </a:fontRef>
+        </p:style>
+        <p:txBody>
+          <a:bodyPr rtlCol="0" anchor="ctr"/>
+          <a:lstStyle/>
+          <a:p>
+            <a:pPr algn="ctr"/>
+            <a:r>
+              <a:rPr lang="en-US" sz="1200" dirty="0">
+                <a:solidFill>
+                  <a:srgbClr val="C00000"/>
+                </a:solidFill>
+              </a:rPr>
+              <a:t>16</a:t>
+            </a:r>
+          </a:p>
+        </p:txBody>
+      </p:sp>
+      <p:sp>
+        <p:nvSpPr>
+          <p:cNvPr id="56" name="Oval 55">
+            <a:extLst>
+              <a:ext uri="{FF2B5EF4-FFF2-40B4-BE49-F238E27FC236}">
+                <a16:creationId xmlns:a16="http://schemas.microsoft.com/office/drawing/2014/main" id="{D4644F3E-9958-486B-8406-999B07C834DA}"/>
+              </a:ext>
+            </a:extLst>
+          </p:cNvPr>
+          <p:cNvSpPr/>
+          <p:nvPr/>
+        </p:nvSpPr>
+        <p:spPr>
+          <a:xfrm>
+            <a:off x="5598175" y="3838288"/>
+            <a:ext cx="523741" cy="247088"/>
+          </a:xfrm>
+          <a:prstGeom prst="ellipse">
+            <a:avLst/>
+          </a:prstGeom>
+          <a:noFill/>
+          <a:ln>
+            <a:noFill/>
+          </a:ln>
+        </p:spPr>
+        <p:style>
+          <a:lnRef idx="2">
+            <a:schemeClr val="accent1">
+              <a:shade val="50000"/>
+            </a:schemeClr>
+          </a:lnRef>
+          <a:fillRef idx="1">
+            <a:schemeClr val="accent1"/>
+          </a:fillRef>
+          <a:effectRef idx="0">
+            <a:schemeClr val="accent1"/>
+          </a:effectRef>
+          <a:fontRef idx="minor">
+            <a:schemeClr val="lt1"/>
+          </a:fontRef>
+        </p:style>
+        <p:txBody>
+          <a:bodyPr rtlCol="0" anchor="ctr"/>
+          <a:lstStyle/>
+          <a:p>
+            <a:pPr algn="ctr"/>
+            <a:r>
+              <a:rPr lang="en-US" sz="1200" dirty="0">
+                <a:solidFill>
+                  <a:srgbClr val="C00000"/>
+                </a:solidFill>
+              </a:rPr>
+              <a:t>17</a:t>
+            </a:r>
+          </a:p>
+        </p:txBody>
+      </p:sp>
+    </p:spTree>
+    <p:extLst>
+      <p:ext uri="{BB962C8B-B14F-4D97-AF65-F5344CB8AC3E}">
+        <p14:creationId xmlns:p14="http://schemas.microsoft.com/office/powerpoint/2010/main" val="3233487712"/>
+      </p:ext>
+    </p:extLst>
+  </p:cSld>
+  <p:clrMapOvr>
+    <a:masterClrMapping/>
+  </p:clrMapOvr>
+</p:sld>
+</file>
+
 <file path=ppt/theme/theme1.xml><?xml version="1.0" encoding="utf-8"?>
 <a:theme xmlns:a="http://schemas.openxmlformats.org/drawingml/2006/main" name="Office Theme">
   <a:themeElements>

</xml_diff>